<commit_message>
TW edits for bullets, diagram, and overview
</commit_message>
<xml_diff>
--- a/docs/deployment_guide/images/mongodb-atlas-mean-stack-architecture-diagram.pptx
+++ b/docs/deployment_guide/images/mongodb-atlas-mean-stack-architecture-diagram.pptx
@@ -223,7 +223,7 @@
           <a:p>
             <a:fld id="{49A7721D-1176-A640-AC48-B82F78C92D56}" type="datetimeFigureOut">
               <a:rPr lang="en-US" smtClean="0"/>
-              <a:t>4/17/2023</a:t>
+              <a:t>4/18/2023</a:t>
             </a:fld>
             <a:endParaRPr lang="en-US" dirty="0"/>
           </a:p>
@@ -400,7 +400,7 @@
           <a:p>
             <a:fld id="{C884A089-FB25-6D46-9D21-F0F04A18BCA8}" type="datetimeFigureOut">
               <a:rPr lang="en-US" smtClean="0"/>
-              <a:t>4/17/2023</a:t>
+              <a:t>4/18/2023</a:t>
             </a:fld>
             <a:endParaRPr lang="en-US" dirty="0"/>
           </a:p>
@@ -1758,486 +1758,475 @@
           </a:prstGeom>
         </p:spPr>
       </p:pic>
-      <p:grpSp>
-        <p:nvGrpSpPr>
-          <p:cNvPr id="24" name="Group 23">
+      <p:sp>
+        <p:nvSpPr>
+          <p:cNvPr id="102" name="Google Shape;74;p4">
             <a:extLst>
               <a:ext uri="{FF2B5EF4-FFF2-40B4-BE49-F238E27FC236}">
-                <a16:creationId xmlns:a16="http://schemas.microsoft.com/office/drawing/2014/main" id="{9951A45B-ACBC-4609-847E-C6C5D3A02E00}"/>
+                <a16:creationId xmlns:a16="http://schemas.microsoft.com/office/drawing/2014/main" id="{B9A47B6E-FDCE-1944-8900-C2992C915F54}"/>
               </a:ext>
             </a:extLst>
           </p:cNvPr>
-          <p:cNvGrpSpPr/>
+          <p:cNvSpPr/>
           <p:nvPr/>
-        </p:nvGrpSpPr>
-        <p:grpSpPr>
+        </p:nvSpPr>
+        <p:spPr>
           <a:xfrm>
-            <a:off x="274320" y="1097280"/>
-            <a:ext cx="3626890" cy="3066580"/>
-            <a:chOff x="201091" y="1097280"/>
-            <a:chExt cx="3626890" cy="3066580"/>
+            <a:off x="741044" y="1607091"/>
+            <a:ext cx="914400" cy="2468880"/>
           </a:xfrm>
-        </p:grpSpPr>
-        <p:sp>
-          <p:nvSpPr>
-            <p:cNvPr id="102" name="Google Shape;74;p4">
-              <a:extLst>
-                <a:ext uri="{FF2B5EF4-FFF2-40B4-BE49-F238E27FC236}">
-                  <a16:creationId xmlns:a16="http://schemas.microsoft.com/office/drawing/2014/main" id="{B9A47B6E-FDCE-1944-8900-C2992C915F54}"/>
-                </a:ext>
-              </a:extLst>
-            </p:cNvPr>
-            <p:cNvSpPr/>
-            <p:nvPr/>
-          </p:nvSpPr>
-          <p:spPr>
-            <a:xfrm>
-              <a:off x="667815" y="1515651"/>
-              <a:ext cx="822960" cy="2468880"/>
-            </a:xfrm>
-            <a:prstGeom prst="rect">
-              <a:avLst/>
-            </a:prstGeom>
+          <a:prstGeom prst="rect">
+            <a:avLst/>
+          </a:prstGeom>
+          <a:noFill/>
+          <a:ln w="12700" cap="flat" cmpd="sng">
+            <a:solidFill>
+              <a:srgbClr val="007DBC"/>
+            </a:solidFill>
+            <a:prstDash val="dash"/>
+            <a:miter lim="800000"/>
+            <a:headEnd type="none" w="sm" len="sm"/>
+            <a:tailEnd type="none" w="sm" len="sm"/>
+          </a:ln>
+        </p:spPr>
+        <p:txBody>
+          <a:bodyPr spcFirstLastPara="1" wrap="square" lIns="91425" tIns="91425" rIns="91425" bIns="45700" anchor="t" anchorCtr="0">
+            <a:noAutofit/>
+          </a:bodyPr>
+          <a:lstStyle/>
+          <a:p>
+            <a:pPr marL="0" marR="0" lvl="0" indent="0" algn="ctr" rtl="0">
+              <a:spcBef>
+                <a:spcPts val="0"/>
+              </a:spcBef>
+              <a:spcAft>
+                <a:spcPts val="0"/>
+              </a:spcAft>
+              <a:buNone/>
+            </a:pPr>
+            <a:r>
+              <a:rPr lang="en-US" sz="1200" b="0" i="0" u="none" strike="noStrike" cap="none" dirty="0">
+                <a:solidFill>
+                  <a:srgbClr val="007DBC"/>
+                </a:solidFill>
+                <a:latin typeface="Arial"/>
+                <a:ea typeface="Arial"/>
+                <a:cs typeface="Arial"/>
+                <a:sym typeface="Arial"/>
+              </a:rPr>
+              <a:t>Availability Zone 1</a:t>
+            </a:r>
+            <a:endParaRPr sz="1200" dirty="0"/>
+          </a:p>
+        </p:txBody>
+      </p:sp>
+      <p:sp>
+        <p:nvSpPr>
+          <p:cNvPr id="103" name="Google Shape;75;p4">
+            <a:extLst>
+              <a:ext uri="{FF2B5EF4-FFF2-40B4-BE49-F238E27FC236}">
+                <a16:creationId xmlns:a16="http://schemas.microsoft.com/office/drawing/2014/main" id="{9ECC2B96-C0D2-A846-A8D0-7B938F5CA591}"/>
+              </a:ext>
+            </a:extLst>
+          </p:cNvPr>
+          <p:cNvSpPr/>
+          <p:nvPr/>
+        </p:nvSpPr>
+        <p:spPr>
+          <a:xfrm>
+            <a:off x="1746884" y="1607091"/>
+            <a:ext cx="914400" cy="2468880"/>
+          </a:xfrm>
+          <a:prstGeom prst="rect">
+            <a:avLst/>
+          </a:prstGeom>
+          <a:noFill/>
+          <a:ln w="12700" cap="flat" cmpd="sng">
+            <a:solidFill>
+              <a:srgbClr val="007DBC"/>
+            </a:solidFill>
+            <a:prstDash val="dash"/>
+            <a:miter lim="800000"/>
+            <a:headEnd type="none" w="sm" len="sm"/>
+            <a:tailEnd type="none" w="sm" len="sm"/>
+          </a:ln>
+        </p:spPr>
+        <p:txBody>
+          <a:bodyPr spcFirstLastPara="1" wrap="square" lIns="91425" tIns="91425" rIns="91425" bIns="45700" anchor="t" anchorCtr="0">
+            <a:noAutofit/>
+          </a:bodyPr>
+          <a:lstStyle/>
+          <a:p>
+            <a:pPr marL="0" marR="0" lvl="0" indent="0" algn="ctr" rtl="0">
+              <a:spcBef>
+                <a:spcPts val="0"/>
+              </a:spcBef>
+              <a:spcAft>
+                <a:spcPts val="0"/>
+              </a:spcAft>
+              <a:buNone/>
+            </a:pPr>
+            <a:r>
+              <a:rPr lang="en-US" sz="1200" b="0" i="0" u="none" strike="noStrike" cap="none" dirty="0">
+                <a:solidFill>
+                  <a:srgbClr val="007DBC"/>
+                </a:solidFill>
+                <a:latin typeface="Arial" panose="020B0604020202020204" pitchFamily="34" charset="0"/>
+                <a:ea typeface="Arial"/>
+                <a:cs typeface="Arial" panose="020B0604020202020204" pitchFamily="34" charset="0"/>
+                <a:sym typeface="Arial"/>
+              </a:rPr>
+              <a:t>Availability Zone </a:t>
+            </a:r>
+            <a:r>
+              <a:rPr lang="en-US" sz="1200" dirty="0">
+                <a:solidFill>
+                  <a:srgbClr val="007DBC"/>
+                </a:solidFill>
+                <a:latin typeface="Arial" panose="020B0604020202020204" pitchFamily="34" charset="0"/>
+                <a:cs typeface="Arial" panose="020B0604020202020204" pitchFamily="34" charset="0"/>
+              </a:rPr>
+              <a:t>2</a:t>
+            </a:r>
+            <a:endParaRPr sz="1200" dirty="0">
+              <a:latin typeface="Arial" panose="020B0604020202020204" pitchFamily="34" charset="0"/>
+              <a:cs typeface="Arial" panose="020B0604020202020204" pitchFamily="34" charset="0"/>
+            </a:endParaRPr>
+          </a:p>
+        </p:txBody>
+      </p:sp>
+      <p:sp>
+        <p:nvSpPr>
+          <p:cNvPr id="104" name="Google Shape;76;p4">
+            <a:extLst>
+              <a:ext uri="{FF2B5EF4-FFF2-40B4-BE49-F238E27FC236}">
+                <a16:creationId xmlns:a16="http://schemas.microsoft.com/office/drawing/2014/main" id="{A0FFD658-C690-974F-8C8F-839D7B457E61}"/>
+              </a:ext>
+            </a:extLst>
+          </p:cNvPr>
+          <p:cNvSpPr/>
+          <p:nvPr/>
+        </p:nvSpPr>
+        <p:spPr>
+          <a:xfrm>
+            <a:off x="2752724" y="1607091"/>
+            <a:ext cx="914400" cy="2468880"/>
+          </a:xfrm>
+          <a:prstGeom prst="rect">
+            <a:avLst/>
+          </a:prstGeom>
+          <a:noFill/>
+          <a:ln w="12700" cap="flat" cmpd="sng">
+            <a:solidFill>
+              <a:srgbClr val="007DBC"/>
+            </a:solidFill>
+            <a:prstDash val="dash"/>
+            <a:miter lim="800000"/>
+            <a:headEnd type="none" w="sm" len="sm"/>
+            <a:tailEnd type="none" w="sm" len="sm"/>
+          </a:ln>
+        </p:spPr>
+        <p:txBody>
+          <a:bodyPr spcFirstLastPara="1" wrap="square" lIns="91425" tIns="91425" rIns="91425" bIns="45700" anchor="t" anchorCtr="0">
+            <a:noAutofit/>
+          </a:bodyPr>
+          <a:lstStyle/>
+          <a:p>
+            <a:pPr marL="0" marR="0" lvl="0" indent="0" algn="ctr" rtl="0">
+              <a:spcBef>
+                <a:spcPts val="0"/>
+              </a:spcBef>
+              <a:spcAft>
+                <a:spcPts val="0"/>
+              </a:spcAft>
+              <a:buNone/>
+            </a:pPr>
+            <a:r>
+              <a:rPr lang="en-US" sz="1200" b="0" i="0" u="none" strike="noStrike" cap="none" dirty="0">
+                <a:solidFill>
+                  <a:srgbClr val="007DBC"/>
+                </a:solidFill>
+                <a:latin typeface="Arial" panose="020B0604020202020204" pitchFamily="34" charset="0"/>
+                <a:ea typeface="Arial"/>
+                <a:cs typeface="Arial" panose="020B0604020202020204" pitchFamily="34" charset="0"/>
+                <a:sym typeface="Arial"/>
+              </a:rPr>
+              <a:t>Availability Zone </a:t>
+            </a:r>
+            <a:r>
+              <a:rPr lang="en-US" sz="1200" dirty="0">
+                <a:solidFill>
+                  <a:srgbClr val="007DBC"/>
+                </a:solidFill>
+                <a:latin typeface="Arial" panose="020B0604020202020204" pitchFamily="34" charset="0"/>
+                <a:cs typeface="Arial" panose="020B0604020202020204" pitchFamily="34" charset="0"/>
+              </a:rPr>
+              <a:t>3</a:t>
+            </a:r>
+            <a:endParaRPr sz="1200" dirty="0">
+              <a:latin typeface="Arial" panose="020B0604020202020204" pitchFamily="34" charset="0"/>
+              <a:cs typeface="Arial" panose="020B0604020202020204" pitchFamily="34" charset="0"/>
+            </a:endParaRPr>
+          </a:p>
+        </p:txBody>
+      </p:sp>
+      <p:sp>
+        <p:nvSpPr>
+          <p:cNvPr id="105" name="Google Shape;77;p4">
+            <a:extLst>
+              <a:ext uri="{FF2B5EF4-FFF2-40B4-BE49-F238E27FC236}">
+                <a16:creationId xmlns:a16="http://schemas.microsoft.com/office/drawing/2014/main" id="{BC9E5CD6-60F9-AA4C-95EF-D61095482087}"/>
+              </a:ext>
+            </a:extLst>
+          </p:cNvPr>
+          <p:cNvSpPr/>
+          <p:nvPr/>
+        </p:nvSpPr>
+        <p:spPr>
+          <a:xfrm>
+            <a:off x="594360" y="2155731"/>
+            <a:ext cx="3200400" cy="1737360"/>
+          </a:xfrm>
+          <a:prstGeom prst="rect">
+            <a:avLst/>
+          </a:prstGeom>
+          <a:solidFill>
+            <a:srgbClr val="EAF2FB">
+              <a:alpha val="77650"/>
+            </a:srgbClr>
+          </a:solidFill>
+          <a:ln w="9525" cap="flat" cmpd="sng">
+            <a:solidFill>
+              <a:srgbClr val="007DBC"/>
+            </a:solidFill>
+            <a:prstDash val="solid"/>
+            <a:round/>
+            <a:headEnd type="none" w="sm" len="sm"/>
+            <a:tailEnd type="none" w="sm" len="sm"/>
+          </a:ln>
+        </p:spPr>
+        <p:txBody>
+          <a:bodyPr spcFirstLastPara="1" wrap="square" lIns="91425" tIns="91425" rIns="91425" bIns="91425" anchor="t" anchorCtr="0">
+            <a:noAutofit/>
+          </a:bodyPr>
+          <a:lstStyle/>
+          <a:p>
+            <a:pPr marL="0" lvl="0" indent="0" algn="l" rtl="0">
+              <a:spcBef>
+                <a:spcPts val="0"/>
+              </a:spcBef>
+              <a:spcAft>
+                <a:spcPts val="0"/>
+              </a:spcAft>
+              <a:buNone/>
+            </a:pPr>
+            <a:endParaRPr sz="1200">
+              <a:solidFill>
+                <a:srgbClr val="007CBC"/>
+              </a:solidFill>
+            </a:endParaRPr>
+          </a:p>
+        </p:txBody>
+      </p:sp>
+      <p:pic>
+        <p:nvPicPr>
+          <p:cNvPr id="106" name="Google Shape;78;p4">
+            <a:extLst>
+              <a:ext uri="{FF2B5EF4-FFF2-40B4-BE49-F238E27FC236}">
+                <a16:creationId xmlns:a16="http://schemas.microsoft.com/office/drawing/2014/main" id="{98F24F72-0E93-9442-BF36-1552AB94B380}"/>
+              </a:ext>
+            </a:extLst>
+          </p:cNvPr>
+          <p:cNvPicPr preferRelativeResize="0"/>
+          <p:nvPr/>
+        </p:nvPicPr>
+        <p:blipFill>
+          <a:blip r:embed="rId8">
+            <a:alphaModFix/>
+          </a:blip>
+          <a:stretch>
+            <a:fillRect/>
+          </a:stretch>
+        </p:blipFill>
+        <p:spPr>
+          <a:xfrm>
+            <a:off x="1472564" y="2155731"/>
+            <a:ext cx="1428415" cy="1148606"/>
+          </a:xfrm>
+          <a:prstGeom prst="rect">
+            <a:avLst/>
+          </a:prstGeom>
+          <a:noFill/>
+          <a:ln>
             <a:noFill/>
-            <a:ln w="12700" cap="flat" cmpd="sng">
-              <a:solidFill>
-                <a:srgbClr val="007DBC"/>
-              </a:solidFill>
-              <a:prstDash val="dash"/>
-              <a:miter lim="800000"/>
-              <a:headEnd type="none" w="sm" len="sm"/>
-              <a:tailEnd type="none" w="sm" len="sm"/>
-            </a:ln>
-          </p:spPr>
-          <p:txBody>
-            <a:bodyPr spcFirstLastPara="1" wrap="square" lIns="91425" tIns="91425" rIns="91425" bIns="45700" anchor="t" anchorCtr="0">
-              <a:noAutofit/>
-            </a:bodyPr>
-            <a:lstStyle/>
-            <a:p>
-              <a:pPr marL="0" marR="0" lvl="0" indent="0" algn="ctr" rtl="0">
-                <a:spcBef>
-                  <a:spcPts val="0"/>
-                </a:spcBef>
-                <a:spcAft>
-                  <a:spcPts val="0"/>
-                </a:spcAft>
-                <a:buNone/>
-              </a:pPr>
-              <a:r>
-                <a:rPr lang="en-US" sz="1000" b="0" i="0" u="none" strike="noStrike" cap="none" dirty="0">
-                  <a:solidFill>
-                    <a:srgbClr val="007DBC"/>
-                  </a:solidFill>
-                  <a:latin typeface="Arial"/>
-                  <a:ea typeface="Arial"/>
-                  <a:cs typeface="Arial"/>
-                  <a:sym typeface="Arial"/>
-                </a:rPr>
-                <a:t>Availability Zone 1</a:t>
-              </a:r>
-              <a:endParaRPr sz="1000" dirty="0"/>
-            </a:p>
-          </p:txBody>
-        </p:sp>
-        <p:sp>
-          <p:nvSpPr>
-            <p:cNvPr id="103" name="Google Shape;75;p4">
-              <a:extLst>
-                <a:ext uri="{FF2B5EF4-FFF2-40B4-BE49-F238E27FC236}">
-                  <a16:creationId xmlns:a16="http://schemas.microsoft.com/office/drawing/2014/main" id="{9ECC2B96-C0D2-A846-A8D0-7B938F5CA591}"/>
-                </a:ext>
-              </a:extLst>
-            </p:cNvPr>
-            <p:cNvSpPr/>
-            <p:nvPr/>
-          </p:nvSpPr>
-          <p:spPr>
-            <a:xfrm>
-              <a:off x="1673655" y="1515651"/>
-              <a:ext cx="822960" cy="2468880"/>
-            </a:xfrm>
-            <a:prstGeom prst="rect">
-              <a:avLst/>
-            </a:prstGeom>
-            <a:noFill/>
-            <a:ln w="12700" cap="flat" cmpd="sng">
-              <a:solidFill>
-                <a:srgbClr val="007DBC"/>
-              </a:solidFill>
-              <a:prstDash val="dash"/>
-              <a:miter lim="800000"/>
-              <a:headEnd type="none" w="sm" len="sm"/>
-              <a:tailEnd type="none" w="sm" len="sm"/>
-            </a:ln>
-          </p:spPr>
-          <p:txBody>
-            <a:bodyPr spcFirstLastPara="1" wrap="square" lIns="91425" tIns="91425" rIns="91425" bIns="45700" anchor="t" anchorCtr="0">
-              <a:noAutofit/>
-            </a:bodyPr>
-            <a:lstStyle/>
-            <a:p>
-              <a:pPr marL="0" marR="0" lvl="0" indent="0" algn="ctr" rtl="0">
-                <a:spcBef>
-                  <a:spcPts val="0"/>
-                </a:spcBef>
-                <a:spcAft>
-                  <a:spcPts val="0"/>
-                </a:spcAft>
-                <a:buNone/>
-              </a:pPr>
-              <a:r>
-                <a:rPr lang="en-US" sz="1000" b="0" i="0" u="none" strike="noStrike" cap="none">
-                  <a:solidFill>
-                    <a:srgbClr val="007DBC"/>
-                  </a:solidFill>
-                  <a:latin typeface="Arial"/>
-                  <a:ea typeface="Arial"/>
-                  <a:cs typeface="Arial"/>
-                  <a:sym typeface="Arial"/>
-                </a:rPr>
-                <a:t>Availability Zone </a:t>
-              </a:r>
-              <a:r>
-                <a:rPr lang="en-US" sz="1000">
-                  <a:solidFill>
-                    <a:srgbClr val="007DBC"/>
-                  </a:solidFill>
-                </a:rPr>
-                <a:t>2</a:t>
-              </a:r>
-              <a:endParaRPr sz="1000"/>
-            </a:p>
-          </p:txBody>
-        </p:sp>
-        <p:sp>
-          <p:nvSpPr>
-            <p:cNvPr id="104" name="Google Shape;76;p4">
-              <a:extLst>
-                <a:ext uri="{FF2B5EF4-FFF2-40B4-BE49-F238E27FC236}">
-                  <a16:creationId xmlns:a16="http://schemas.microsoft.com/office/drawing/2014/main" id="{A0FFD658-C690-974F-8C8F-839D7B457E61}"/>
-                </a:ext>
-              </a:extLst>
-            </p:cNvPr>
-            <p:cNvSpPr/>
-            <p:nvPr/>
-          </p:nvSpPr>
-          <p:spPr>
-            <a:xfrm>
-              <a:off x="2679495" y="1515651"/>
-              <a:ext cx="822960" cy="2468880"/>
-            </a:xfrm>
-            <a:prstGeom prst="rect">
-              <a:avLst/>
-            </a:prstGeom>
-            <a:noFill/>
-            <a:ln w="12700" cap="flat" cmpd="sng">
-              <a:solidFill>
-                <a:srgbClr val="007DBC"/>
-              </a:solidFill>
-              <a:prstDash val="dash"/>
-              <a:miter lim="800000"/>
-              <a:headEnd type="none" w="sm" len="sm"/>
-              <a:tailEnd type="none" w="sm" len="sm"/>
-            </a:ln>
-          </p:spPr>
-          <p:txBody>
-            <a:bodyPr spcFirstLastPara="1" wrap="square" lIns="91425" tIns="91425" rIns="91425" bIns="45700" anchor="t" anchorCtr="0">
-              <a:noAutofit/>
-            </a:bodyPr>
-            <a:lstStyle/>
-            <a:p>
-              <a:pPr marL="0" marR="0" lvl="0" indent="0" algn="ctr" rtl="0">
-                <a:spcBef>
-                  <a:spcPts val="0"/>
-                </a:spcBef>
-                <a:spcAft>
-                  <a:spcPts val="0"/>
-                </a:spcAft>
-                <a:buNone/>
-              </a:pPr>
-              <a:r>
-                <a:rPr lang="en-US" sz="1000" b="0" i="0" u="none" strike="noStrike" cap="none">
-                  <a:solidFill>
-                    <a:srgbClr val="007DBC"/>
-                  </a:solidFill>
-                  <a:latin typeface="Arial"/>
-                  <a:ea typeface="Arial"/>
-                  <a:cs typeface="Arial"/>
-                  <a:sym typeface="Arial"/>
-                </a:rPr>
-                <a:t>Availability Zone </a:t>
-              </a:r>
-              <a:r>
-                <a:rPr lang="en-US" sz="1000">
-                  <a:solidFill>
-                    <a:srgbClr val="007DBC"/>
-                  </a:solidFill>
-                </a:rPr>
-                <a:t>3</a:t>
-              </a:r>
-              <a:endParaRPr sz="1000"/>
-            </a:p>
-          </p:txBody>
-        </p:sp>
-        <p:sp>
-          <p:nvSpPr>
-            <p:cNvPr id="105" name="Google Shape;77;p4">
-              <a:extLst>
-                <a:ext uri="{FF2B5EF4-FFF2-40B4-BE49-F238E27FC236}">
-                  <a16:creationId xmlns:a16="http://schemas.microsoft.com/office/drawing/2014/main" id="{BC9E5CD6-60F9-AA4C-95EF-D61095482087}"/>
-                </a:ext>
-              </a:extLst>
-            </p:cNvPr>
-            <p:cNvSpPr/>
-            <p:nvPr/>
-          </p:nvSpPr>
-          <p:spPr>
-            <a:xfrm>
-              <a:off x="484935" y="2064291"/>
-              <a:ext cx="3200400" cy="1737360"/>
-            </a:xfrm>
-            <a:prstGeom prst="rect">
-              <a:avLst/>
-            </a:prstGeom>
+          </a:ln>
+        </p:spPr>
+      </p:pic>
+      <p:sp>
+        <p:nvSpPr>
+          <p:cNvPr id="107" name="Google Shape;79;p4">
+            <a:extLst>
+              <a:ext uri="{FF2B5EF4-FFF2-40B4-BE49-F238E27FC236}">
+                <a16:creationId xmlns:a16="http://schemas.microsoft.com/office/drawing/2014/main" id="{2F59AB2E-A2C1-A944-9183-34163224F09B}"/>
+              </a:ext>
+            </a:extLst>
+          </p:cNvPr>
+          <p:cNvSpPr txBox="1"/>
+          <p:nvPr/>
+        </p:nvSpPr>
+        <p:spPr>
+          <a:xfrm>
+            <a:off x="1564004" y="3161571"/>
+            <a:ext cx="1191600" cy="548640"/>
+          </a:xfrm>
+          <a:prstGeom prst="rect">
+            <a:avLst/>
+          </a:prstGeom>
+          <a:solidFill>
+            <a:srgbClr val="FFFFFF"/>
+          </a:solidFill>
+          <a:ln w="9525" cap="flat" cmpd="sng">
             <a:solidFill>
-              <a:srgbClr val="EAF2FB">
-                <a:alpha val="77650"/>
-              </a:srgbClr>
+              <a:schemeClr val="accent6"/>
             </a:solidFill>
-            <a:ln w="9525" cap="flat" cmpd="sng">
-              <a:solidFill>
-                <a:srgbClr val="007DBC"/>
-              </a:solidFill>
-              <a:prstDash val="solid"/>
-              <a:round/>
-              <a:headEnd type="none" w="sm" len="sm"/>
-              <a:tailEnd type="none" w="sm" len="sm"/>
-            </a:ln>
-          </p:spPr>
-          <p:txBody>
-            <a:bodyPr spcFirstLastPara="1" wrap="square" lIns="91425" tIns="91425" rIns="91425" bIns="91425" anchor="t" anchorCtr="0">
-              <a:noAutofit/>
-            </a:bodyPr>
-            <a:lstStyle/>
-            <a:p>
-              <a:pPr marL="0" lvl="0" indent="0" algn="l" rtl="0">
-                <a:spcBef>
-                  <a:spcPts val="0"/>
-                </a:spcBef>
-                <a:spcAft>
-                  <a:spcPts val="0"/>
-                </a:spcAft>
-                <a:buNone/>
-              </a:pPr>
-              <a:endParaRPr sz="1200">
-                <a:solidFill>
-                  <a:srgbClr val="007CBC"/>
-                </a:solidFill>
-              </a:endParaRPr>
-            </a:p>
-          </p:txBody>
-        </p:sp>
-        <p:pic>
-          <p:nvPicPr>
-            <p:cNvPr id="106" name="Google Shape;78;p4">
-              <a:extLst>
-                <a:ext uri="{FF2B5EF4-FFF2-40B4-BE49-F238E27FC236}">
-                  <a16:creationId xmlns:a16="http://schemas.microsoft.com/office/drawing/2014/main" id="{98F24F72-0E93-9442-BF36-1552AB94B380}"/>
-                </a:ext>
-              </a:extLst>
-            </p:cNvPr>
-            <p:cNvPicPr preferRelativeResize="0"/>
-            <p:nvPr/>
-          </p:nvPicPr>
-          <p:blipFill>
-            <a:blip r:embed="rId8">
-              <a:alphaModFix/>
-            </a:blip>
-            <a:stretch>
-              <a:fillRect/>
-            </a:stretch>
-          </p:blipFill>
-          <p:spPr>
-            <a:xfrm>
-              <a:off x="1399335" y="2064291"/>
-              <a:ext cx="1428415" cy="1148606"/>
-            </a:xfrm>
-            <a:prstGeom prst="rect">
-              <a:avLst/>
-            </a:prstGeom>
-            <a:noFill/>
-            <a:ln>
-              <a:noFill/>
-            </a:ln>
-          </p:spPr>
-        </p:pic>
-        <p:sp>
-          <p:nvSpPr>
-            <p:cNvPr id="107" name="Google Shape;79;p4">
-              <a:extLst>
-                <a:ext uri="{FF2B5EF4-FFF2-40B4-BE49-F238E27FC236}">
-                  <a16:creationId xmlns:a16="http://schemas.microsoft.com/office/drawing/2014/main" id="{2F59AB2E-A2C1-A944-9183-34163224F09B}"/>
-                </a:ext>
-              </a:extLst>
-            </p:cNvPr>
-            <p:cNvSpPr txBox="1"/>
-            <p:nvPr/>
-          </p:nvSpPr>
-          <p:spPr>
-            <a:xfrm>
-              <a:off x="1490775" y="3070131"/>
-              <a:ext cx="1191600" cy="548640"/>
-            </a:xfrm>
-            <a:prstGeom prst="rect">
-              <a:avLst/>
-            </a:prstGeom>
+            <a:prstDash val="solid"/>
+            <a:round/>
+            <a:headEnd type="none" w="sm" len="sm"/>
+            <a:tailEnd type="none" w="sm" len="sm"/>
+          </a:ln>
+        </p:spPr>
+        <p:txBody>
+          <a:bodyPr spcFirstLastPara="1" wrap="square" lIns="91425" tIns="45700" rIns="91425" bIns="45700" anchor="ctr" anchorCtr="0">
+            <a:noAutofit/>
+          </a:bodyPr>
+          <a:lstStyle/>
+          <a:p>
+            <a:pPr marL="0" marR="0" lvl="0" indent="0" algn="ctr" rtl="0">
+              <a:spcBef>
+                <a:spcPts val="0"/>
+              </a:spcBef>
+              <a:spcAft>
+                <a:spcPts val="0"/>
+              </a:spcAft>
+              <a:buNone/>
+            </a:pPr>
+            <a:r>
+              <a:rPr lang="en-US" sz="1200" dirty="0">
+                <a:solidFill>
+                  <a:schemeClr val="dk1"/>
+                </a:solidFill>
+              </a:rPr>
+              <a:t>MongoDB Atlas cluster</a:t>
+            </a:r>
+            <a:endParaRPr dirty="0"/>
+          </a:p>
+        </p:txBody>
+      </p:sp>
+      <p:pic>
+        <p:nvPicPr>
+          <p:cNvPr id="30" name="Graphic 29">
+            <a:extLst>
+              <a:ext uri="{FF2B5EF4-FFF2-40B4-BE49-F238E27FC236}">
+                <a16:creationId xmlns:a16="http://schemas.microsoft.com/office/drawing/2014/main" id="{B7F107A0-34DF-43A2-9ED8-011BB6652713}"/>
+              </a:ext>
+            </a:extLst>
+          </p:cNvPr>
+          <p:cNvPicPr>
+            <a:picLocks noChangeAspect="1"/>
+          </p:cNvPicPr>
+          <p:nvPr/>
+        </p:nvPicPr>
+        <p:blipFill>
+          <a:blip r:embed="rId6">
+            <a:extLst>
+              <a:ext uri="{96DAC541-7B7A-43D3-8B79-37D633B846F1}">
+                <asvg:svgBlip xmlns:asvg="http://schemas.microsoft.com/office/drawing/2016/SVG/main" r:embed="rId7"/>
+              </a:ext>
+            </a:extLst>
+          </a:blip>
+          <a:srcRect/>
+          <a:stretch/>
+        </p:blipFill>
+        <p:spPr>
+          <a:xfrm>
+            <a:off x="274320" y="1188720"/>
+            <a:ext cx="381000" cy="381000"/>
+          </a:xfrm>
+          <a:prstGeom prst="rect">
+            <a:avLst/>
+          </a:prstGeom>
+        </p:spPr>
+      </p:pic>
+      <p:sp>
+        <p:nvSpPr>
+          <p:cNvPr id="31" name="Rectangle 30">
+            <a:extLst>
+              <a:ext uri="{FF2B5EF4-FFF2-40B4-BE49-F238E27FC236}">
+                <a16:creationId xmlns:a16="http://schemas.microsoft.com/office/drawing/2014/main" id="{D24D1A17-AA6D-4D12-A787-5472C1CD9876}"/>
+              </a:ext>
+            </a:extLst>
+          </p:cNvPr>
+          <p:cNvSpPr/>
+          <p:nvPr/>
+        </p:nvSpPr>
+        <p:spPr>
+          <a:xfrm>
+            <a:off x="275907" y="1188720"/>
+            <a:ext cx="3625303" cy="3291840"/>
+          </a:xfrm>
+          <a:prstGeom prst="rect">
+            <a:avLst/>
+          </a:prstGeom>
+          <a:noFill/>
+          <a:ln w="12700">
             <a:solidFill>
-              <a:srgbClr val="FFFFFF"/>
+              <a:srgbClr val="693BC5"/>
             </a:solidFill>
-            <a:ln w="9525" cap="flat" cmpd="sng">
-              <a:solidFill>
-                <a:schemeClr val="accent6"/>
-              </a:solidFill>
-              <a:prstDash val="solid"/>
-              <a:round/>
-              <a:headEnd type="none" w="sm" len="sm"/>
-              <a:tailEnd type="none" w="sm" len="sm"/>
-            </a:ln>
-          </p:spPr>
-          <p:txBody>
-            <a:bodyPr spcFirstLastPara="1" wrap="square" lIns="91425" tIns="45700" rIns="91425" bIns="45700" anchor="ctr" anchorCtr="0">
-              <a:noAutofit/>
-            </a:bodyPr>
-            <a:lstStyle/>
-            <a:p>
-              <a:pPr marL="0" marR="0" lvl="0" indent="0" algn="ctr" rtl="0">
-                <a:spcBef>
-                  <a:spcPts val="0"/>
-                </a:spcBef>
-                <a:spcAft>
-                  <a:spcPts val="0"/>
-                </a:spcAft>
-                <a:buNone/>
-              </a:pPr>
-              <a:r>
-                <a:rPr lang="en-US" sz="1200" dirty="0">
-                  <a:solidFill>
-                    <a:schemeClr val="dk1"/>
-                  </a:solidFill>
-                </a:rPr>
-                <a:t>MongoDB Atlas cluster</a:t>
-              </a:r>
-              <a:endParaRPr dirty="0"/>
-            </a:p>
-          </p:txBody>
-        </p:sp>
-        <p:pic>
-          <p:nvPicPr>
-            <p:cNvPr id="30" name="Graphic 29">
-              <a:extLst>
-                <a:ext uri="{FF2B5EF4-FFF2-40B4-BE49-F238E27FC236}">
-                  <a16:creationId xmlns:a16="http://schemas.microsoft.com/office/drawing/2014/main" id="{B7F107A0-34DF-43A2-9ED8-011BB6652713}"/>
-                </a:ext>
-              </a:extLst>
-            </p:cNvPr>
-            <p:cNvPicPr>
-              <a:picLocks noChangeAspect="1"/>
-            </p:cNvPicPr>
-            <p:nvPr/>
-          </p:nvPicPr>
-          <p:blipFill>
-            <a:blip r:embed="rId6">
-              <a:extLst>
-                <a:ext uri="{96DAC541-7B7A-43D3-8B79-37D633B846F1}">
-                  <asvg:svgBlip xmlns:asvg="http://schemas.microsoft.com/office/drawing/2016/SVG/main" r:embed="rId7"/>
-                </a:ext>
-              </a:extLst>
-            </a:blip>
-            <a:srcRect/>
-            <a:stretch/>
-          </p:blipFill>
-          <p:spPr>
-            <a:xfrm>
-              <a:off x="201091" y="1097280"/>
-              <a:ext cx="381000" cy="381000"/>
-            </a:xfrm>
-            <a:prstGeom prst="rect">
-              <a:avLst/>
-            </a:prstGeom>
-          </p:spPr>
-        </p:pic>
-        <p:sp>
-          <p:nvSpPr>
-            <p:cNvPr id="31" name="Rectangle 30">
-              <a:extLst>
-                <a:ext uri="{FF2B5EF4-FFF2-40B4-BE49-F238E27FC236}">
-                  <a16:creationId xmlns:a16="http://schemas.microsoft.com/office/drawing/2014/main" id="{D24D1A17-AA6D-4D12-A787-5472C1CD9876}"/>
-                </a:ext>
-              </a:extLst>
-            </p:cNvPr>
-            <p:cNvSpPr/>
-            <p:nvPr/>
-          </p:nvSpPr>
-          <p:spPr>
-            <a:xfrm>
-              <a:off x="202678" y="1097280"/>
-              <a:ext cx="3625303" cy="3066580"/>
-            </a:xfrm>
-            <a:prstGeom prst="rect">
-              <a:avLst/>
-            </a:prstGeom>
-            <a:noFill/>
-            <a:ln w="12700">
-              <a:solidFill>
-                <a:srgbClr val="693BC5"/>
-              </a:solidFill>
-            </a:ln>
-          </p:spPr>
-          <p:style>
-            <a:lnRef idx="2">
-              <a:schemeClr val="accent1">
-                <a:shade val="50000"/>
-              </a:schemeClr>
-            </a:lnRef>
-            <a:fillRef idx="1">
-              <a:schemeClr val="accent1"/>
-            </a:fillRef>
-            <a:effectRef idx="0">
-              <a:schemeClr val="accent1"/>
-            </a:effectRef>
-            <a:fontRef idx="minor">
-              <a:schemeClr val="lt1"/>
-            </a:fontRef>
-          </p:style>
-          <p:txBody>
-            <a:bodyPr lIns="502920" tIns="91440"/>
-            <a:lstStyle/>
-            <a:p>
-              <a:pPr eaLnBrk="1" fontAlgn="auto" hangingPunct="1">
-                <a:spcBef>
-                  <a:spcPts val="0"/>
-                </a:spcBef>
-                <a:spcAft>
-                  <a:spcPts val="0"/>
-                </a:spcAft>
-                <a:defRPr/>
-              </a:pPr>
-              <a:r>
-                <a:rPr lang="en-US" sz="1200" dirty="0">
-                  <a:ln w="0"/>
-                  <a:solidFill>
-                    <a:srgbClr val="693BC5"/>
-                  </a:solidFill>
-                  <a:latin typeface="Arial" panose="020B0604020202020204" pitchFamily="34" charset="0"/>
-                  <a:cs typeface="Arial" panose="020B0604020202020204" pitchFamily="34" charset="0"/>
-                </a:rPr>
-                <a:t>MongoDB Atlas project VPC</a:t>
-              </a:r>
-            </a:p>
-          </p:txBody>
-        </p:sp>
-      </p:grpSp>
+          </a:ln>
+        </p:spPr>
+        <p:style>
+          <a:lnRef idx="2">
+            <a:schemeClr val="accent1">
+              <a:shade val="50000"/>
+            </a:schemeClr>
+          </a:lnRef>
+          <a:fillRef idx="1">
+            <a:schemeClr val="accent1"/>
+          </a:fillRef>
+          <a:effectRef idx="0">
+            <a:schemeClr val="accent1"/>
+          </a:effectRef>
+          <a:fontRef idx="minor">
+            <a:schemeClr val="lt1"/>
+          </a:fontRef>
+        </p:style>
+        <p:txBody>
+          <a:bodyPr lIns="502920" tIns="91440"/>
+          <a:lstStyle/>
+          <a:p>
+            <a:pPr eaLnBrk="1" fontAlgn="auto" hangingPunct="1">
+              <a:spcBef>
+                <a:spcPts val="0"/>
+              </a:spcBef>
+              <a:spcAft>
+                <a:spcPts val="0"/>
+              </a:spcAft>
+              <a:defRPr/>
+            </a:pPr>
+            <a:r>
+              <a:rPr lang="en-US" sz="1200" dirty="0">
+                <a:ln w="0"/>
+                <a:solidFill>
+                  <a:srgbClr val="693BC5"/>
+                </a:solidFill>
+                <a:latin typeface="Arial" panose="020B0604020202020204" pitchFamily="34" charset="0"/>
+                <a:cs typeface="Arial" panose="020B0604020202020204" pitchFamily="34" charset="0"/>
+              </a:rPr>
+              <a:t>MongoDB Atlas project VPC</a:t>
+            </a:r>
+          </a:p>
+        </p:txBody>
+      </p:sp>
       <p:pic>
         <p:nvPicPr>
           <p:cNvPr id="32" name="Graphic 31">
@@ -3196,10 +3185,10 @@
       </p:sp>
       <p:sp>
         <p:nvSpPr>
-          <p:cNvPr id="12" name="TextBox 19">
+          <p:cNvPr id="20" name="TextBox 28">
             <a:extLst>
               <a:ext uri="{FF2B5EF4-FFF2-40B4-BE49-F238E27FC236}">
-                <a16:creationId xmlns:a16="http://schemas.microsoft.com/office/drawing/2014/main" id="{6CFAA5BD-D560-DED9-4397-80F299A68C9D}"/>
+                <a16:creationId xmlns:a16="http://schemas.microsoft.com/office/drawing/2014/main" id="{336ED3E0-9D55-65AF-9066-1CF862BF0D21}"/>
               </a:ext>
             </a:extLst>
           </p:cNvPr>
@@ -3210,244 +3199,8 @@
         </p:nvSpPr>
         <p:spPr bwMode="auto">
           <a:xfrm>
-            <a:off x="7818120" y="3246120"/>
-            <a:ext cx="914400" cy="548640"/>
-          </a:xfrm>
-          <a:prstGeom prst="rect">
-            <a:avLst/>
-          </a:prstGeom>
-          <a:noFill/>
-          <a:ln>
-            <a:noFill/>
-          </a:ln>
-          <a:extLst>
-            <a:ext uri="{909E8E84-426E-40DD-AFC4-6F175D3DCCD1}">
-              <a14:hiddenFill xmlns:a14="http://schemas.microsoft.com/office/drawing/2010/main">
-                <a:solidFill>
-                  <a:srgbClr val="FFFFFF"/>
-                </a:solidFill>
-              </a14:hiddenFill>
-            </a:ext>
-            <a:ext uri="{91240B29-F687-4F45-9708-019B960494DF}">
-              <a14:hiddenLine xmlns:a14="http://schemas.microsoft.com/office/drawing/2010/main" w="9525">
-                <a:solidFill>
-                  <a:srgbClr val="000000"/>
-                </a:solidFill>
-                <a:miter lim="800000"/>
-                <a:headEnd/>
-                <a:tailEnd/>
-              </a14:hiddenLine>
-            </a:ext>
-          </a:extLst>
-        </p:spPr>
-        <p:txBody>
-          <a:bodyPr wrap="square">
-            <a:spAutoFit/>
-          </a:bodyPr>
-          <a:lstStyle>
-            <a:lvl1pPr>
-              <a:defRPr>
-                <a:solidFill>
-                  <a:schemeClr val="tx1"/>
-                </a:solidFill>
-                <a:latin typeface="Calibri" panose="020F0502020204030204" pitchFamily="34" charset="0"/>
-              </a:defRPr>
-            </a:lvl1pPr>
-            <a:lvl2pPr marL="742950" indent="-285750">
-              <a:defRPr>
-                <a:solidFill>
-                  <a:schemeClr val="tx1"/>
-                </a:solidFill>
-                <a:latin typeface="Calibri" panose="020F0502020204030204" pitchFamily="34" charset="0"/>
-              </a:defRPr>
-            </a:lvl2pPr>
-            <a:lvl3pPr marL="1143000" indent="-228600">
-              <a:defRPr>
-                <a:solidFill>
-                  <a:schemeClr val="tx1"/>
-                </a:solidFill>
-                <a:latin typeface="Calibri" panose="020F0502020204030204" pitchFamily="34" charset="0"/>
-              </a:defRPr>
-            </a:lvl3pPr>
-            <a:lvl4pPr marL="1600200" indent="-228600">
-              <a:defRPr>
-                <a:solidFill>
-                  <a:schemeClr val="tx1"/>
-                </a:solidFill>
-                <a:latin typeface="Calibri" panose="020F0502020204030204" pitchFamily="34" charset="0"/>
-              </a:defRPr>
-            </a:lvl4pPr>
-            <a:lvl5pPr marL="2057400" indent="-228600">
-              <a:defRPr>
-                <a:solidFill>
-                  <a:schemeClr val="tx1"/>
-                </a:solidFill>
-                <a:latin typeface="Calibri" panose="020F0502020204030204" pitchFamily="34" charset="0"/>
-              </a:defRPr>
-            </a:lvl5pPr>
-            <a:lvl6pPr marL="2514600" indent="-228600" eaLnBrk="0" fontAlgn="base" hangingPunct="0">
-              <a:spcBef>
-                <a:spcPct val="0"/>
-              </a:spcBef>
-              <a:spcAft>
-                <a:spcPct val="0"/>
-              </a:spcAft>
-              <a:defRPr>
-                <a:solidFill>
-                  <a:schemeClr val="tx1"/>
-                </a:solidFill>
-                <a:latin typeface="Calibri" panose="020F0502020204030204" pitchFamily="34" charset="0"/>
-              </a:defRPr>
-            </a:lvl6pPr>
-            <a:lvl7pPr marL="2971800" indent="-228600" eaLnBrk="0" fontAlgn="base" hangingPunct="0">
-              <a:spcBef>
-                <a:spcPct val="0"/>
-              </a:spcBef>
-              <a:spcAft>
-                <a:spcPct val="0"/>
-              </a:spcAft>
-              <a:defRPr>
-                <a:solidFill>
-                  <a:schemeClr val="tx1"/>
-                </a:solidFill>
-                <a:latin typeface="Calibri" panose="020F0502020204030204" pitchFamily="34" charset="0"/>
-              </a:defRPr>
-            </a:lvl7pPr>
-            <a:lvl8pPr marL="3429000" indent="-228600" eaLnBrk="0" fontAlgn="base" hangingPunct="0">
-              <a:spcBef>
-                <a:spcPct val="0"/>
-              </a:spcBef>
-              <a:spcAft>
-                <a:spcPct val="0"/>
-              </a:spcAft>
-              <a:defRPr>
-                <a:solidFill>
-                  <a:schemeClr val="tx1"/>
-                </a:solidFill>
-                <a:latin typeface="Calibri" panose="020F0502020204030204" pitchFamily="34" charset="0"/>
-              </a:defRPr>
-            </a:lvl8pPr>
-            <a:lvl9pPr marL="3886200" indent="-228600" eaLnBrk="0" fontAlgn="base" hangingPunct="0">
-              <a:spcBef>
-                <a:spcPct val="0"/>
-              </a:spcBef>
-              <a:spcAft>
-                <a:spcPct val="0"/>
-              </a:spcAft>
-              <a:defRPr>
-                <a:solidFill>
-                  <a:schemeClr val="tx1"/>
-                </a:solidFill>
-                <a:latin typeface="Calibri" panose="020F0502020204030204" pitchFamily="34" charset="0"/>
-              </a:defRPr>
-            </a:lvl9pPr>
-          </a:lstStyle>
-          <a:p>
-            <a:pPr algn="ctr" eaLnBrk="1" hangingPunct="1"/>
-            <a:r>
-              <a:rPr lang="en-US" altLang="en-US" sz="1100" dirty="0">
-                <a:latin typeface="Arial" panose="020B0604020202020204" pitchFamily="34" charset="0"/>
-                <a:ea typeface="Amazon Ember" panose="020B0603020204020204" pitchFamily="34" charset="0"/>
-                <a:cs typeface="Arial" panose="020B0604020202020204" pitchFamily="34" charset="0"/>
-              </a:rPr>
-              <a:t>Application Load </a:t>
-            </a:r>
-            <a:br>
-              <a:rPr lang="en-US" altLang="en-US" sz="1100" dirty="0">
-                <a:latin typeface="Arial" panose="020B0604020202020204" pitchFamily="34" charset="0"/>
-                <a:ea typeface="Amazon Ember" panose="020B0603020204020204" pitchFamily="34" charset="0"/>
-                <a:cs typeface="Arial" panose="020B0604020202020204" pitchFamily="34" charset="0"/>
-              </a:rPr>
-            </a:br>
-            <a:r>
-              <a:rPr lang="en-US" altLang="en-US" sz="1100" dirty="0">
-                <a:latin typeface="Arial" panose="020B0604020202020204" pitchFamily="34" charset="0"/>
-                <a:ea typeface="Amazon Ember" panose="020B0603020204020204" pitchFamily="34" charset="0"/>
-                <a:cs typeface="Arial" panose="020B0604020202020204" pitchFamily="34" charset="0"/>
-              </a:rPr>
-              <a:t>Balancer</a:t>
-            </a:r>
-          </a:p>
-        </p:txBody>
-      </p:sp>
-      <p:pic>
-        <p:nvPicPr>
-          <p:cNvPr id="13" name="Graphic 8">
-            <a:extLst>
-              <a:ext uri="{FF2B5EF4-FFF2-40B4-BE49-F238E27FC236}">
-                <a16:creationId xmlns:a16="http://schemas.microsoft.com/office/drawing/2014/main" id="{62E6F608-1FB9-1D67-EEBC-632853564491}"/>
-              </a:ext>
-            </a:extLst>
-          </p:cNvPr>
-          <p:cNvPicPr>
-            <a:picLocks noChangeAspect="1" noChangeArrowheads="1"/>
-          </p:cNvPicPr>
-          <p:nvPr/>
-        </p:nvPicPr>
-        <p:blipFill>
-          <a:blip r:embed="rId15">
-            <a:extLst>
-              <a:ext uri="{28A0092B-C50C-407E-A947-70E740481C1C}">
-                <a14:useLocalDpi xmlns:a14="http://schemas.microsoft.com/office/drawing/2010/main" val="0"/>
-              </a:ext>
-            </a:extLst>
-          </a:blip>
-          <a:srcRect/>
-          <a:stretch>
-            <a:fillRect/>
-          </a:stretch>
-        </p:blipFill>
-        <p:spPr bwMode="auto">
-          <a:xfrm>
-            <a:off x="8046720" y="2834640"/>
-            <a:ext cx="457200" cy="457200"/>
-          </a:xfrm>
-          <a:prstGeom prst="rect">
-            <a:avLst/>
-          </a:prstGeom>
-          <a:noFill/>
-          <a:ln>
-            <a:noFill/>
-          </a:ln>
-          <a:extLst>
-            <a:ext uri="{909E8E84-426E-40DD-AFC4-6F175D3DCCD1}">
-              <a14:hiddenFill xmlns:a14="http://schemas.microsoft.com/office/drawing/2010/main">
-                <a:solidFill>
-                  <a:srgbClr val="FFFFFF"/>
-                </a:solidFill>
-              </a14:hiddenFill>
-            </a:ext>
-            <a:ext uri="{91240B29-F687-4F45-9708-019B960494DF}">
-              <a14:hiddenLine xmlns:a14="http://schemas.microsoft.com/office/drawing/2010/main" w="9525">
-                <a:solidFill>
-                  <a:srgbClr val="000000"/>
-                </a:solidFill>
-                <a:miter lim="800000"/>
-                <a:headEnd/>
-                <a:tailEnd/>
-              </a14:hiddenLine>
-            </a:ext>
-          </a:extLst>
-        </p:spPr>
-      </p:pic>
-      <p:sp>
-        <p:nvSpPr>
-          <p:cNvPr id="18" name="TextBox 28">
-            <a:extLst>
-              <a:ext uri="{FF2B5EF4-FFF2-40B4-BE49-F238E27FC236}">
-                <a16:creationId xmlns:a16="http://schemas.microsoft.com/office/drawing/2014/main" id="{E99B0E7E-5F14-4F7D-23B0-E64BEF2A407F}"/>
-              </a:ext>
-            </a:extLst>
-          </p:cNvPr>
-          <p:cNvSpPr txBox="1">
-            <a:spLocks noChangeArrowheads="1"/>
-          </p:cNvSpPr>
-          <p:nvPr/>
-        </p:nvSpPr>
-        <p:spPr bwMode="auto">
-          <a:xfrm>
-            <a:off x="9052560" y="3246120"/>
-            <a:ext cx="1097280" cy="261610"/>
+            <a:off x="8869680" y="4069080"/>
+            <a:ext cx="1371600" cy="274320"/>
           </a:xfrm>
           <a:prstGeom prst="rect">
             <a:avLst/>
@@ -3586,17 +3339,17 @@
                 <a:ea typeface="Amazon Ember" panose="020B0603020204020204" pitchFamily="34" charset="0"/>
                 <a:cs typeface="Arial" panose="020B0604020202020204" pitchFamily="34" charset="0"/>
               </a:rPr>
-              <a:t>Client service</a:t>
+              <a:t>Server application</a:t>
             </a:r>
           </a:p>
         </p:txBody>
       </p:sp>
       <p:pic>
         <p:nvPicPr>
-          <p:cNvPr id="19" name="Graphic 38">
+          <p:cNvPr id="21" name="Graphic 38">
             <a:extLst>
               <a:ext uri="{FF2B5EF4-FFF2-40B4-BE49-F238E27FC236}">
-                <a16:creationId xmlns:a16="http://schemas.microsoft.com/office/drawing/2014/main" id="{A938A782-3457-54CD-E50D-00DA112790EF}"/>
+                <a16:creationId xmlns:a16="http://schemas.microsoft.com/office/drawing/2014/main" id="{6FD61B6D-5100-09DD-D191-4A4E83A80EF2}"/>
               </a:ext>
             </a:extLst>
           </p:cNvPr>
@@ -3606,228 +3359,7 @@
           <p:nvPr/>
         </p:nvPicPr>
         <p:blipFill>
-          <a:blip r:embed="rId16">
-            <a:extLst>
-              <a:ext uri="{28A0092B-C50C-407E-A947-70E740481C1C}">
-                <a14:useLocalDpi xmlns:a14="http://schemas.microsoft.com/office/drawing/2010/main" val="0"/>
-              </a:ext>
-            </a:extLst>
-          </a:blip>
-          <a:srcRect/>
-          <a:stretch>
-            <a:fillRect/>
-          </a:stretch>
-        </p:blipFill>
-        <p:spPr bwMode="auto">
-          <a:xfrm>
-            <a:off x="9326880" y="2834640"/>
-            <a:ext cx="457200" cy="457200"/>
-          </a:xfrm>
-          <a:prstGeom prst="rect">
-            <a:avLst/>
-          </a:prstGeom>
-          <a:noFill/>
-          <a:ln>
-            <a:noFill/>
-          </a:ln>
-          <a:extLst>
-            <a:ext uri="{909E8E84-426E-40DD-AFC4-6F175D3DCCD1}">
-              <a14:hiddenFill xmlns:a14="http://schemas.microsoft.com/office/drawing/2010/main">
-                <a:solidFill>
-                  <a:srgbClr val="FFFFFF"/>
-                </a:solidFill>
-              </a14:hiddenFill>
-            </a:ext>
-            <a:ext uri="{91240B29-F687-4F45-9708-019B960494DF}">
-              <a14:hiddenLine xmlns:a14="http://schemas.microsoft.com/office/drawing/2010/main" w="9525">
-                <a:solidFill>
-                  <a:srgbClr val="000000"/>
-                </a:solidFill>
-                <a:miter lim="800000"/>
-                <a:headEnd/>
-                <a:tailEnd/>
-              </a14:hiddenLine>
-            </a:ext>
-          </a:extLst>
-        </p:spPr>
-      </p:pic>
-      <p:sp>
-        <p:nvSpPr>
-          <p:cNvPr id="20" name="TextBox 28">
-            <a:extLst>
-              <a:ext uri="{FF2B5EF4-FFF2-40B4-BE49-F238E27FC236}">
-                <a16:creationId xmlns:a16="http://schemas.microsoft.com/office/drawing/2014/main" id="{336ED3E0-9D55-65AF-9066-1CF862BF0D21}"/>
-              </a:ext>
-            </a:extLst>
-          </p:cNvPr>
-          <p:cNvSpPr txBox="1">
-            <a:spLocks noChangeArrowheads="1"/>
-          </p:cNvSpPr>
-          <p:nvPr/>
-        </p:nvSpPr>
-        <p:spPr bwMode="auto">
-          <a:xfrm>
-            <a:off x="9052560" y="4069080"/>
-            <a:ext cx="1097280" cy="261610"/>
-          </a:xfrm>
-          <a:prstGeom prst="rect">
-            <a:avLst/>
-          </a:prstGeom>
-          <a:noFill/>
-          <a:ln>
-            <a:noFill/>
-          </a:ln>
-          <a:extLst>
-            <a:ext uri="{909E8E84-426E-40DD-AFC4-6F175D3DCCD1}">
-              <a14:hiddenFill xmlns:a14="http://schemas.microsoft.com/office/drawing/2010/main">
-                <a:solidFill>
-                  <a:srgbClr val="FFFFFF"/>
-                </a:solidFill>
-              </a14:hiddenFill>
-            </a:ext>
-            <a:ext uri="{91240B29-F687-4F45-9708-019B960494DF}">
-              <a14:hiddenLine xmlns:a14="http://schemas.microsoft.com/office/drawing/2010/main" w="9525">
-                <a:solidFill>
-                  <a:srgbClr val="000000"/>
-                </a:solidFill>
-                <a:miter lim="800000"/>
-                <a:headEnd/>
-                <a:tailEnd/>
-              </a14:hiddenLine>
-            </a:ext>
-          </a:extLst>
-        </p:spPr>
-        <p:txBody>
-          <a:bodyPr>
-            <a:spAutoFit/>
-          </a:bodyPr>
-          <a:lstStyle>
-            <a:lvl1pPr>
-              <a:defRPr>
-                <a:solidFill>
-                  <a:schemeClr val="tx1"/>
-                </a:solidFill>
-                <a:latin typeface="Calibri" panose="020F0502020204030204" pitchFamily="34" charset="0"/>
-              </a:defRPr>
-            </a:lvl1pPr>
-            <a:lvl2pPr marL="742950" indent="-285750">
-              <a:defRPr>
-                <a:solidFill>
-                  <a:schemeClr val="tx1"/>
-                </a:solidFill>
-                <a:latin typeface="Calibri" panose="020F0502020204030204" pitchFamily="34" charset="0"/>
-              </a:defRPr>
-            </a:lvl2pPr>
-            <a:lvl3pPr marL="1143000" indent="-228600">
-              <a:defRPr>
-                <a:solidFill>
-                  <a:schemeClr val="tx1"/>
-                </a:solidFill>
-                <a:latin typeface="Calibri" panose="020F0502020204030204" pitchFamily="34" charset="0"/>
-              </a:defRPr>
-            </a:lvl3pPr>
-            <a:lvl4pPr marL="1600200" indent="-228600">
-              <a:defRPr>
-                <a:solidFill>
-                  <a:schemeClr val="tx1"/>
-                </a:solidFill>
-                <a:latin typeface="Calibri" panose="020F0502020204030204" pitchFamily="34" charset="0"/>
-              </a:defRPr>
-            </a:lvl4pPr>
-            <a:lvl5pPr marL="2057400" indent="-228600">
-              <a:defRPr>
-                <a:solidFill>
-                  <a:schemeClr val="tx1"/>
-                </a:solidFill>
-                <a:latin typeface="Calibri" panose="020F0502020204030204" pitchFamily="34" charset="0"/>
-              </a:defRPr>
-            </a:lvl5pPr>
-            <a:lvl6pPr marL="2514600" indent="-228600" eaLnBrk="0" fontAlgn="base" hangingPunct="0">
-              <a:spcBef>
-                <a:spcPct val="0"/>
-              </a:spcBef>
-              <a:spcAft>
-                <a:spcPct val="0"/>
-              </a:spcAft>
-              <a:defRPr>
-                <a:solidFill>
-                  <a:schemeClr val="tx1"/>
-                </a:solidFill>
-                <a:latin typeface="Calibri" panose="020F0502020204030204" pitchFamily="34" charset="0"/>
-              </a:defRPr>
-            </a:lvl6pPr>
-            <a:lvl7pPr marL="2971800" indent="-228600" eaLnBrk="0" fontAlgn="base" hangingPunct="0">
-              <a:spcBef>
-                <a:spcPct val="0"/>
-              </a:spcBef>
-              <a:spcAft>
-                <a:spcPct val="0"/>
-              </a:spcAft>
-              <a:defRPr>
-                <a:solidFill>
-                  <a:schemeClr val="tx1"/>
-                </a:solidFill>
-                <a:latin typeface="Calibri" panose="020F0502020204030204" pitchFamily="34" charset="0"/>
-              </a:defRPr>
-            </a:lvl7pPr>
-            <a:lvl8pPr marL="3429000" indent="-228600" eaLnBrk="0" fontAlgn="base" hangingPunct="0">
-              <a:spcBef>
-                <a:spcPct val="0"/>
-              </a:spcBef>
-              <a:spcAft>
-                <a:spcPct val="0"/>
-              </a:spcAft>
-              <a:defRPr>
-                <a:solidFill>
-                  <a:schemeClr val="tx1"/>
-                </a:solidFill>
-                <a:latin typeface="Calibri" panose="020F0502020204030204" pitchFamily="34" charset="0"/>
-              </a:defRPr>
-            </a:lvl8pPr>
-            <a:lvl9pPr marL="3886200" indent="-228600" eaLnBrk="0" fontAlgn="base" hangingPunct="0">
-              <a:spcBef>
-                <a:spcPct val="0"/>
-              </a:spcBef>
-              <a:spcAft>
-                <a:spcPct val="0"/>
-              </a:spcAft>
-              <a:defRPr>
-                <a:solidFill>
-                  <a:schemeClr val="tx1"/>
-                </a:solidFill>
-                <a:latin typeface="Calibri" panose="020F0502020204030204" pitchFamily="34" charset="0"/>
-              </a:defRPr>
-            </a:lvl9pPr>
-          </a:lstStyle>
-          <a:p>
-            <a:pPr algn="ctr" eaLnBrk="1" hangingPunct="1"/>
-            <a:r>
-              <a:rPr lang="en-US" altLang="en-US" sz="1100" dirty="0">
-                <a:latin typeface="Arial" panose="020B0604020202020204" pitchFamily="34" charset="0"/>
-                <a:ea typeface="Amazon Ember" panose="020B0603020204020204" pitchFamily="34" charset="0"/>
-                <a:cs typeface="Arial" panose="020B0604020202020204" pitchFamily="34" charset="0"/>
-              </a:rPr>
-              <a:t>Server service</a:t>
-            </a:r>
-          </a:p>
-        </p:txBody>
-      </p:sp>
-      <p:pic>
-        <p:nvPicPr>
-          <p:cNvPr id="21" name="Graphic 38">
-            <a:extLst>
-              <a:ext uri="{FF2B5EF4-FFF2-40B4-BE49-F238E27FC236}">
-                <a16:creationId xmlns:a16="http://schemas.microsoft.com/office/drawing/2014/main" id="{6FD61B6D-5100-09DD-D191-4A4E83A80EF2}"/>
-              </a:ext>
-            </a:extLst>
-          </p:cNvPr>
-          <p:cNvPicPr>
-            <a:picLocks noChangeAspect="1" noChangeArrowheads="1"/>
-          </p:cNvPicPr>
-          <p:nvPr/>
-        </p:nvPicPr>
-        <p:blipFill>
-          <a:blip r:embed="rId16">
+          <a:blip r:embed="rId15">
             <a:extLst>
               <a:ext uri="{28A0092B-C50C-407E-A947-70E740481C1C}">
                 <a14:useLocalDpi xmlns:a14="http://schemas.microsoft.com/office/drawing/2010/main" val="0"/>
@@ -3872,106 +3404,951 @@
           </a:extLst>
         </p:spPr>
       </p:pic>
-      <p:cxnSp>
-        <p:nvCxnSpPr>
-          <p:cNvPr id="22" name="Straight Arrow Connector 21">
+      <p:grpSp>
+        <p:nvGrpSpPr>
+          <p:cNvPr id="11" name="Group 10">
             <a:extLst>
               <a:ext uri="{FF2B5EF4-FFF2-40B4-BE49-F238E27FC236}">
-                <a16:creationId xmlns:a16="http://schemas.microsoft.com/office/drawing/2014/main" id="{E0758A49-FAB0-6DC8-487A-35CBE4954511}"/>
+                <a16:creationId xmlns:a16="http://schemas.microsoft.com/office/drawing/2014/main" id="{6607467E-675F-41BC-855D-A21CC6F2BC84}"/>
               </a:ext>
             </a:extLst>
           </p:cNvPr>
-          <p:cNvCxnSpPr>
-            <a:cxnSpLocks/>
-            <a:stCxn id="13" idx="1"/>
-            <a:endCxn id="15" idx="3"/>
-          </p:cNvCxnSpPr>
+          <p:cNvGrpSpPr/>
           <p:nvPr/>
-        </p:nvCxnSpPr>
-        <p:spPr>
-          <a:xfrm flipH="1">
-            <a:off x="7223760" y="3063240"/>
-            <a:ext cx="822960" cy="0"/>
+        </p:nvGrpSpPr>
+        <p:grpSpPr>
+          <a:xfrm>
+            <a:off x="4251960" y="2743200"/>
+            <a:ext cx="5846445" cy="960120"/>
+            <a:chOff x="4251960" y="2834640"/>
+            <a:chExt cx="5846445" cy="960120"/>
           </a:xfrm>
-          <a:prstGeom prst="straightConnector1">
-            <a:avLst/>
-          </a:prstGeom>
-          <a:ln w="12700">
-            <a:solidFill>
-              <a:schemeClr val="tx2"/>
-            </a:solidFill>
-            <a:headEnd type="none" w="med" len="sm"/>
-            <a:tailEnd type="arrow" w="med" len="sm"/>
-          </a:ln>
-        </p:spPr>
-        <p:style>
-          <a:lnRef idx="1">
-            <a:schemeClr val="accent1"/>
-          </a:lnRef>
-          <a:fillRef idx="0">
-            <a:schemeClr val="accent1"/>
-          </a:fillRef>
-          <a:effectRef idx="0">
-            <a:schemeClr val="accent1"/>
-          </a:effectRef>
-          <a:fontRef idx="minor">
-            <a:schemeClr val="tx1"/>
-          </a:fontRef>
-        </p:style>
-      </p:cxnSp>
-      <p:cxnSp>
-        <p:nvCxnSpPr>
-          <p:cNvPr id="23" name="Straight Arrow Connector 22">
-            <a:extLst>
-              <a:ext uri="{FF2B5EF4-FFF2-40B4-BE49-F238E27FC236}">
-                <a16:creationId xmlns:a16="http://schemas.microsoft.com/office/drawing/2014/main" id="{228EDAAE-78C2-AA39-7570-91B170A7D52B}"/>
-              </a:ext>
-            </a:extLst>
-          </p:cNvPr>
-          <p:cNvCxnSpPr>
-            <a:cxnSpLocks/>
-            <a:stCxn id="13" idx="3"/>
-            <a:endCxn id="19" idx="1"/>
-          </p:cNvCxnSpPr>
-          <p:nvPr/>
-        </p:nvCxnSpPr>
-        <p:spPr>
-          <a:xfrm>
-            <a:off x="8503920" y="3063240"/>
-            <a:ext cx="822960" cy="0"/>
-          </a:xfrm>
-          <a:prstGeom prst="straightConnector1">
-            <a:avLst/>
-          </a:prstGeom>
-          <a:ln w="12700">
-            <a:solidFill>
-              <a:schemeClr val="tx2"/>
-            </a:solidFill>
-            <a:headEnd type="none" w="med" len="sm"/>
-            <a:tailEnd type="arrow" w="med" len="sm"/>
-          </a:ln>
-        </p:spPr>
-        <p:style>
-          <a:lnRef idx="1">
-            <a:schemeClr val="accent1"/>
-          </a:lnRef>
-          <a:fillRef idx="0">
-            <a:schemeClr val="accent1"/>
-          </a:fillRef>
-          <a:effectRef idx="0">
-            <a:schemeClr val="accent1"/>
-          </a:effectRef>
-          <a:fontRef idx="minor">
-            <a:schemeClr val="tx1"/>
-          </a:fontRef>
-        </p:style>
-      </p:cxnSp>
+        </p:grpSpPr>
+        <p:sp>
+          <p:nvSpPr>
+            <p:cNvPr id="12" name="TextBox 19">
+              <a:extLst>
+                <a:ext uri="{FF2B5EF4-FFF2-40B4-BE49-F238E27FC236}">
+                  <a16:creationId xmlns:a16="http://schemas.microsoft.com/office/drawing/2014/main" id="{6CFAA5BD-D560-DED9-4397-80F299A68C9D}"/>
+                </a:ext>
+              </a:extLst>
+            </p:cNvPr>
+            <p:cNvSpPr txBox="1">
+              <a:spLocks noChangeArrowheads="1"/>
+            </p:cNvSpPr>
+            <p:nvPr/>
+          </p:nvSpPr>
+          <p:spPr bwMode="auto">
+            <a:xfrm>
+              <a:off x="7818120" y="3246120"/>
+              <a:ext cx="914400" cy="548640"/>
+            </a:xfrm>
+            <a:prstGeom prst="rect">
+              <a:avLst/>
+            </a:prstGeom>
+            <a:noFill/>
+            <a:ln>
+              <a:noFill/>
+            </a:ln>
+            <a:extLst>
+              <a:ext uri="{909E8E84-426E-40DD-AFC4-6F175D3DCCD1}">
+                <a14:hiddenFill xmlns:a14="http://schemas.microsoft.com/office/drawing/2010/main">
+                  <a:solidFill>
+                    <a:srgbClr val="FFFFFF"/>
+                  </a:solidFill>
+                </a14:hiddenFill>
+              </a:ext>
+              <a:ext uri="{91240B29-F687-4F45-9708-019B960494DF}">
+                <a14:hiddenLine xmlns:a14="http://schemas.microsoft.com/office/drawing/2010/main" w="9525">
+                  <a:solidFill>
+                    <a:srgbClr val="000000"/>
+                  </a:solidFill>
+                  <a:miter lim="800000"/>
+                  <a:headEnd/>
+                  <a:tailEnd/>
+                </a14:hiddenLine>
+              </a:ext>
+            </a:extLst>
+          </p:spPr>
+          <p:txBody>
+            <a:bodyPr wrap="square">
+              <a:spAutoFit/>
+            </a:bodyPr>
+            <a:lstStyle>
+              <a:lvl1pPr>
+                <a:defRPr>
+                  <a:solidFill>
+                    <a:schemeClr val="tx1"/>
+                  </a:solidFill>
+                  <a:latin typeface="Calibri" panose="020F0502020204030204" pitchFamily="34" charset="0"/>
+                </a:defRPr>
+              </a:lvl1pPr>
+              <a:lvl2pPr marL="742950" indent="-285750">
+                <a:defRPr>
+                  <a:solidFill>
+                    <a:schemeClr val="tx1"/>
+                  </a:solidFill>
+                  <a:latin typeface="Calibri" panose="020F0502020204030204" pitchFamily="34" charset="0"/>
+                </a:defRPr>
+              </a:lvl2pPr>
+              <a:lvl3pPr marL="1143000" indent="-228600">
+                <a:defRPr>
+                  <a:solidFill>
+                    <a:schemeClr val="tx1"/>
+                  </a:solidFill>
+                  <a:latin typeface="Calibri" panose="020F0502020204030204" pitchFamily="34" charset="0"/>
+                </a:defRPr>
+              </a:lvl3pPr>
+              <a:lvl4pPr marL="1600200" indent="-228600">
+                <a:defRPr>
+                  <a:solidFill>
+                    <a:schemeClr val="tx1"/>
+                  </a:solidFill>
+                  <a:latin typeface="Calibri" panose="020F0502020204030204" pitchFamily="34" charset="0"/>
+                </a:defRPr>
+              </a:lvl4pPr>
+              <a:lvl5pPr marL="2057400" indent="-228600">
+                <a:defRPr>
+                  <a:solidFill>
+                    <a:schemeClr val="tx1"/>
+                  </a:solidFill>
+                  <a:latin typeface="Calibri" panose="020F0502020204030204" pitchFamily="34" charset="0"/>
+                </a:defRPr>
+              </a:lvl5pPr>
+              <a:lvl6pPr marL="2514600" indent="-228600" eaLnBrk="0" fontAlgn="base" hangingPunct="0">
+                <a:spcBef>
+                  <a:spcPct val="0"/>
+                </a:spcBef>
+                <a:spcAft>
+                  <a:spcPct val="0"/>
+                </a:spcAft>
+                <a:defRPr>
+                  <a:solidFill>
+                    <a:schemeClr val="tx1"/>
+                  </a:solidFill>
+                  <a:latin typeface="Calibri" panose="020F0502020204030204" pitchFamily="34" charset="0"/>
+                </a:defRPr>
+              </a:lvl6pPr>
+              <a:lvl7pPr marL="2971800" indent="-228600" eaLnBrk="0" fontAlgn="base" hangingPunct="0">
+                <a:spcBef>
+                  <a:spcPct val="0"/>
+                </a:spcBef>
+                <a:spcAft>
+                  <a:spcPct val="0"/>
+                </a:spcAft>
+                <a:defRPr>
+                  <a:solidFill>
+                    <a:schemeClr val="tx1"/>
+                  </a:solidFill>
+                  <a:latin typeface="Calibri" panose="020F0502020204030204" pitchFamily="34" charset="0"/>
+                </a:defRPr>
+              </a:lvl7pPr>
+              <a:lvl8pPr marL="3429000" indent="-228600" eaLnBrk="0" fontAlgn="base" hangingPunct="0">
+                <a:spcBef>
+                  <a:spcPct val="0"/>
+                </a:spcBef>
+                <a:spcAft>
+                  <a:spcPct val="0"/>
+                </a:spcAft>
+                <a:defRPr>
+                  <a:solidFill>
+                    <a:schemeClr val="tx1"/>
+                  </a:solidFill>
+                  <a:latin typeface="Calibri" panose="020F0502020204030204" pitchFamily="34" charset="0"/>
+                </a:defRPr>
+              </a:lvl8pPr>
+              <a:lvl9pPr marL="3886200" indent="-228600" eaLnBrk="0" fontAlgn="base" hangingPunct="0">
+                <a:spcBef>
+                  <a:spcPct val="0"/>
+                </a:spcBef>
+                <a:spcAft>
+                  <a:spcPct val="0"/>
+                </a:spcAft>
+                <a:defRPr>
+                  <a:solidFill>
+                    <a:schemeClr val="tx1"/>
+                  </a:solidFill>
+                  <a:latin typeface="Calibri" panose="020F0502020204030204" pitchFamily="34" charset="0"/>
+                </a:defRPr>
+              </a:lvl9pPr>
+            </a:lstStyle>
+            <a:p>
+              <a:pPr algn="ctr" eaLnBrk="1" hangingPunct="1"/>
+              <a:r>
+                <a:rPr lang="en-US" altLang="en-US" sz="1100" dirty="0">
+                  <a:latin typeface="Arial" panose="020B0604020202020204" pitchFamily="34" charset="0"/>
+                  <a:ea typeface="Amazon Ember" panose="020B0603020204020204" pitchFamily="34" charset="0"/>
+                  <a:cs typeface="Arial" panose="020B0604020202020204" pitchFamily="34" charset="0"/>
+                </a:rPr>
+                <a:t>Application Load </a:t>
+              </a:r>
+              <a:br>
+                <a:rPr lang="en-US" altLang="en-US" sz="1100" dirty="0">
+                  <a:latin typeface="Arial" panose="020B0604020202020204" pitchFamily="34" charset="0"/>
+                  <a:ea typeface="Amazon Ember" panose="020B0603020204020204" pitchFamily="34" charset="0"/>
+                  <a:cs typeface="Arial" panose="020B0604020202020204" pitchFamily="34" charset="0"/>
+                </a:rPr>
+              </a:br>
+              <a:r>
+                <a:rPr lang="en-US" altLang="en-US" sz="1100" dirty="0">
+                  <a:latin typeface="Arial" panose="020B0604020202020204" pitchFamily="34" charset="0"/>
+                  <a:ea typeface="Amazon Ember" panose="020B0603020204020204" pitchFamily="34" charset="0"/>
+                  <a:cs typeface="Arial" panose="020B0604020202020204" pitchFamily="34" charset="0"/>
+                </a:rPr>
+                <a:t>Balancer</a:t>
+              </a:r>
+            </a:p>
+          </p:txBody>
+        </p:sp>
+        <p:pic>
+          <p:nvPicPr>
+            <p:cNvPr id="13" name="Graphic 8">
+              <a:extLst>
+                <a:ext uri="{FF2B5EF4-FFF2-40B4-BE49-F238E27FC236}">
+                  <a16:creationId xmlns:a16="http://schemas.microsoft.com/office/drawing/2014/main" id="{62E6F608-1FB9-1D67-EEBC-632853564491}"/>
+                </a:ext>
+              </a:extLst>
+            </p:cNvPr>
+            <p:cNvPicPr>
+              <a:picLocks noChangeAspect="1" noChangeArrowheads="1"/>
+            </p:cNvPicPr>
+            <p:nvPr/>
+          </p:nvPicPr>
+          <p:blipFill>
+            <a:blip r:embed="rId16">
+              <a:extLst>
+                <a:ext uri="{28A0092B-C50C-407E-A947-70E740481C1C}">
+                  <a14:useLocalDpi xmlns:a14="http://schemas.microsoft.com/office/drawing/2010/main" val="0"/>
+                </a:ext>
+              </a:extLst>
+            </a:blip>
+            <a:srcRect/>
+            <a:stretch>
+              <a:fillRect/>
+            </a:stretch>
+          </p:blipFill>
+          <p:spPr bwMode="auto">
+            <a:xfrm>
+              <a:off x="8046720" y="2834640"/>
+              <a:ext cx="457200" cy="457200"/>
+            </a:xfrm>
+            <a:prstGeom prst="rect">
+              <a:avLst/>
+            </a:prstGeom>
+            <a:noFill/>
+            <a:ln>
+              <a:noFill/>
+            </a:ln>
+            <a:extLst>
+              <a:ext uri="{909E8E84-426E-40DD-AFC4-6F175D3DCCD1}">
+                <a14:hiddenFill xmlns:a14="http://schemas.microsoft.com/office/drawing/2010/main">
+                  <a:solidFill>
+                    <a:srgbClr val="FFFFFF"/>
+                  </a:solidFill>
+                </a14:hiddenFill>
+              </a:ext>
+              <a:ext uri="{91240B29-F687-4F45-9708-019B960494DF}">
+                <a14:hiddenLine xmlns:a14="http://schemas.microsoft.com/office/drawing/2010/main" w="9525">
+                  <a:solidFill>
+                    <a:srgbClr val="000000"/>
+                  </a:solidFill>
+                  <a:miter lim="800000"/>
+                  <a:headEnd/>
+                  <a:tailEnd/>
+                </a14:hiddenLine>
+              </a:ext>
+            </a:extLst>
+          </p:spPr>
+        </p:pic>
+        <p:sp>
+          <p:nvSpPr>
+            <p:cNvPr id="18" name="TextBox 28">
+              <a:extLst>
+                <a:ext uri="{FF2B5EF4-FFF2-40B4-BE49-F238E27FC236}">
+                  <a16:creationId xmlns:a16="http://schemas.microsoft.com/office/drawing/2014/main" id="{E99B0E7E-5F14-4F7D-23B0-E64BEF2A407F}"/>
+                </a:ext>
+              </a:extLst>
+            </p:cNvPr>
+            <p:cNvSpPr txBox="1">
+              <a:spLocks noChangeArrowheads="1"/>
+            </p:cNvSpPr>
+            <p:nvPr/>
+          </p:nvSpPr>
+          <p:spPr bwMode="auto">
+            <a:xfrm>
+              <a:off x="9001125" y="3246120"/>
+              <a:ext cx="1097280" cy="430887"/>
+            </a:xfrm>
+            <a:prstGeom prst="rect">
+              <a:avLst/>
+            </a:prstGeom>
+            <a:noFill/>
+            <a:ln>
+              <a:noFill/>
+            </a:ln>
+            <a:extLst>
+              <a:ext uri="{909E8E84-426E-40DD-AFC4-6F175D3DCCD1}">
+                <a14:hiddenFill xmlns:a14="http://schemas.microsoft.com/office/drawing/2010/main">
+                  <a:solidFill>
+                    <a:srgbClr val="FFFFFF"/>
+                  </a:solidFill>
+                </a14:hiddenFill>
+              </a:ext>
+              <a:ext uri="{91240B29-F687-4F45-9708-019B960494DF}">
+                <a14:hiddenLine xmlns:a14="http://schemas.microsoft.com/office/drawing/2010/main" w="9525">
+                  <a:solidFill>
+                    <a:srgbClr val="000000"/>
+                  </a:solidFill>
+                  <a:miter lim="800000"/>
+                  <a:headEnd/>
+                  <a:tailEnd/>
+                </a14:hiddenLine>
+              </a:ext>
+            </a:extLst>
+          </p:spPr>
+          <p:txBody>
+            <a:bodyPr>
+              <a:spAutoFit/>
+            </a:bodyPr>
+            <a:lstStyle>
+              <a:lvl1pPr>
+                <a:defRPr>
+                  <a:solidFill>
+                    <a:schemeClr val="tx1"/>
+                  </a:solidFill>
+                  <a:latin typeface="Calibri" panose="020F0502020204030204" pitchFamily="34" charset="0"/>
+                </a:defRPr>
+              </a:lvl1pPr>
+              <a:lvl2pPr marL="742950" indent="-285750">
+                <a:defRPr>
+                  <a:solidFill>
+                    <a:schemeClr val="tx1"/>
+                  </a:solidFill>
+                  <a:latin typeface="Calibri" panose="020F0502020204030204" pitchFamily="34" charset="0"/>
+                </a:defRPr>
+              </a:lvl2pPr>
+              <a:lvl3pPr marL="1143000" indent="-228600">
+                <a:defRPr>
+                  <a:solidFill>
+                    <a:schemeClr val="tx1"/>
+                  </a:solidFill>
+                  <a:latin typeface="Calibri" panose="020F0502020204030204" pitchFamily="34" charset="0"/>
+                </a:defRPr>
+              </a:lvl3pPr>
+              <a:lvl4pPr marL="1600200" indent="-228600">
+                <a:defRPr>
+                  <a:solidFill>
+                    <a:schemeClr val="tx1"/>
+                  </a:solidFill>
+                  <a:latin typeface="Calibri" panose="020F0502020204030204" pitchFamily="34" charset="0"/>
+                </a:defRPr>
+              </a:lvl4pPr>
+              <a:lvl5pPr marL="2057400" indent="-228600">
+                <a:defRPr>
+                  <a:solidFill>
+                    <a:schemeClr val="tx1"/>
+                  </a:solidFill>
+                  <a:latin typeface="Calibri" panose="020F0502020204030204" pitchFamily="34" charset="0"/>
+                </a:defRPr>
+              </a:lvl5pPr>
+              <a:lvl6pPr marL="2514600" indent="-228600" eaLnBrk="0" fontAlgn="base" hangingPunct="0">
+                <a:spcBef>
+                  <a:spcPct val="0"/>
+                </a:spcBef>
+                <a:spcAft>
+                  <a:spcPct val="0"/>
+                </a:spcAft>
+                <a:defRPr>
+                  <a:solidFill>
+                    <a:schemeClr val="tx1"/>
+                  </a:solidFill>
+                  <a:latin typeface="Calibri" panose="020F0502020204030204" pitchFamily="34" charset="0"/>
+                </a:defRPr>
+              </a:lvl6pPr>
+              <a:lvl7pPr marL="2971800" indent="-228600" eaLnBrk="0" fontAlgn="base" hangingPunct="0">
+                <a:spcBef>
+                  <a:spcPct val="0"/>
+                </a:spcBef>
+                <a:spcAft>
+                  <a:spcPct val="0"/>
+                </a:spcAft>
+                <a:defRPr>
+                  <a:solidFill>
+                    <a:schemeClr val="tx1"/>
+                  </a:solidFill>
+                  <a:latin typeface="Calibri" panose="020F0502020204030204" pitchFamily="34" charset="0"/>
+                </a:defRPr>
+              </a:lvl7pPr>
+              <a:lvl8pPr marL="3429000" indent="-228600" eaLnBrk="0" fontAlgn="base" hangingPunct="0">
+                <a:spcBef>
+                  <a:spcPct val="0"/>
+                </a:spcBef>
+                <a:spcAft>
+                  <a:spcPct val="0"/>
+                </a:spcAft>
+                <a:defRPr>
+                  <a:solidFill>
+                    <a:schemeClr val="tx1"/>
+                  </a:solidFill>
+                  <a:latin typeface="Calibri" panose="020F0502020204030204" pitchFamily="34" charset="0"/>
+                </a:defRPr>
+              </a:lvl8pPr>
+              <a:lvl9pPr marL="3886200" indent="-228600" eaLnBrk="0" fontAlgn="base" hangingPunct="0">
+                <a:spcBef>
+                  <a:spcPct val="0"/>
+                </a:spcBef>
+                <a:spcAft>
+                  <a:spcPct val="0"/>
+                </a:spcAft>
+                <a:defRPr>
+                  <a:solidFill>
+                    <a:schemeClr val="tx1"/>
+                  </a:solidFill>
+                  <a:latin typeface="Calibri" panose="020F0502020204030204" pitchFamily="34" charset="0"/>
+                </a:defRPr>
+              </a:lvl9pPr>
+            </a:lstStyle>
+            <a:p>
+              <a:pPr algn="ctr" eaLnBrk="1" hangingPunct="1"/>
+              <a:r>
+                <a:rPr lang="en-US" altLang="en-US" sz="1100" dirty="0">
+                  <a:latin typeface="Arial" panose="020B0604020202020204" pitchFamily="34" charset="0"/>
+                  <a:ea typeface="Amazon Ember" panose="020B0603020204020204" pitchFamily="34" charset="0"/>
+                  <a:cs typeface="Arial" panose="020B0604020202020204" pitchFamily="34" charset="0"/>
+                </a:rPr>
+                <a:t>Angular client application</a:t>
+              </a:r>
+            </a:p>
+          </p:txBody>
+        </p:sp>
+        <p:pic>
+          <p:nvPicPr>
+            <p:cNvPr id="19" name="Graphic 38">
+              <a:extLst>
+                <a:ext uri="{FF2B5EF4-FFF2-40B4-BE49-F238E27FC236}">
+                  <a16:creationId xmlns:a16="http://schemas.microsoft.com/office/drawing/2014/main" id="{A938A782-3457-54CD-E50D-00DA112790EF}"/>
+                </a:ext>
+              </a:extLst>
+            </p:cNvPr>
+            <p:cNvPicPr>
+              <a:picLocks noChangeAspect="1" noChangeArrowheads="1"/>
+            </p:cNvPicPr>
+            <p:nvPr/>
+          </p:nvPicPr>
+          <p:blipFill>
+            <a:blip r:embed="rId15">
+              <a:extLst>
+                <a:ext uri="{28A0092B-C50C-407E-A947-70E740481C1C}">
+                  <a14:useLocalDpi xmlns:a14="http://schemas.microsoft.com/office/drawing/2010/main" val="0"/>
+                </a:ext>
+              </a:extLst>
+            </a:blip>
+            <a:srcRect/>
+            <a:stretch>
+              <a:fillRect/>
+            </a:stretch>
+          </p:blipFill>
+          <p:spPr bwMode="auto">
+            <a:xfrm>
+              <a:off x="9326880" y="2834640"/>
+              <a:ext cx="457200" cy="457200"/>
+            </a:xfrm>
+            <a:prstGeom prst="rect">
+              <a:avLst/>
+            </a:prstGeom>
+            <a:noFill/>
+            <a:ln>
+              <a:noFill/>
+            </a:ln>
+            <a:extLst>
+              <a:ext uri="{909E8E84-426E-40DD-AFC4-6F175D3DCCD1}">
+                <a14:hiddenFill xmlns:a14="http://schemas.microsoft.com/office/drawing/2010/main">
+                  <a:solidFill>
+                    <a:srgbClr val="FFFFFF"/>
+                  </a:solidFill>
+                </a14:hiddenFill>
+              </a:ext>
+              <a:ext uri="{91240B29-F687-4F45-9708-019B960494DF}">
+                <a14:hiddenLine xmlns:a14="http://schemas.microsoft.com/office/drawing/2010/main" w="9525">
+                  <a:solidFill>
+                    <a:srgbClr val="000000"/>
+                  </a:solidFill>
+                  <a:miter lim="800000"/>
+                  <a:headEnd/>
+                  <a:tailEnd/>
+                </a14:hiddenLine>
+              </a:ext>
+            </a:extLst>
+          </p:spPr>
+        </p:pic>
+        <p:cxnSp>
+          <p:nvCxnSpPr>
+            <p:cNvPr id="22" name="Straight Arrow Connector 21">
+              <a:extLst>
+                <a:ext uri="{FF2B5EF4-FFF2-40B4-BE49-F238E27FC236}">
+                  <a16:creationId xmlns:a16="http://schemas.microsoft.com/office/drawing/2014/main" id="{E0758A49-FAB0-6DC8-487A-35CBE4954511}"/>
+                </a:ext>
+              </a:extLst>
+            </p:cNvPr>
+            <p:cNvCxnSpPr>
+              <a:cxnSpLocks/>
+              <a:stCxn id="13" idx="1"/>
+              <a:endCxn id="15" idx="3"/>
+            </p:cNvCxnSpPr>
+            <p:nvPr/>
+          </p:nvCxnSpPr>
+          <p:spPr>
+            <a:xfrm flipH="1">
+              <a:off x="7223760" y="3063240"/>
+              <a:ext cx="822960" cy="0"/>
+            </a:xfrm>
+            <a:prstGeom prst="straightConnector1">
+              <a:avLst/>
+            </a:prstGeom>
+            <a:ln w="12700">
+              <a:solidFill>
+                <a:schemeClr val="tx2"/>
+              </a:solidFill>
+              <a:headEnd type="none" w="med" len="sm"/>
+              <a:tailEnd type="arrow" w="med" len="sm"/>
+            </a:ln>
+          </p:spPr>
+          <p:style>
+            <a:lnRef idx="1">
+              <a:schemeClr val="accent1"/>
+            </a:lnRef>
+            <a:fillRef idx="0">
+              <a:schemeClr val="accent1"/>
+            </a:fillRef>
+            <a:effectRef idx="0">
+              <a:schemeClr val="accent1"/>
+            </a:effectRef>
+            <a:fontRef idx="minor">
+              <a:schemeClr val="tx1"/>
+            </a:fontRef>
+          </p:style>
+        </p:cxnSp>
+        <p:cxnSp>
+          <p:nvCxnSpPr>
+            <p:cNvPr id="23" name="Straight Arrow Connector 22">
+              <a:extLst>
+                <a:ext uri="{FF2B5EF4-FFF2-40B4-BE49-F238E27FC236}">
+                  <a16:creationId xmlns:a16="http://schemas.microsoft.com/office/drawing/2014/main" id="{228EDAAE-78C2-AA39-7570-91B170A7D52B}"/>
+                </a:ext>
+              </a:extLst>
+            </p:cNvPr>
+            <p:cNvCxnSpPr>
+              <a:cxnSpLocks/>
+              <a:stCxn id="13" idx="3"/>
+              <a:endCxn id="19" idx="1"/>
+            </p:cNvCxnSpPr>
+            <p:nvPr/>
+          </p:nvCxnSpPr>
+          <p:spPr>
+            <a:xfrm>
+              <a:off x="8503920" y="3063240"/>
+              <a:ext cx="822960" cy="0"/>
+            </a:xfrm>
+            <a:prstGeom prst="straightConnector1">
+              <a:avLst/>
+            </a:prstGeom>
+            <a:ln w="12700">
+              <a:solidFill>
+                <a:schemeClr val="tx2"/>
+              </a:solidFill>
+              <a:headEnd type="none" w="med" len="sm"/>
+              <a:tailEnd type="arrow" w="med" len="sm"/>
+            </a:ln>
+          </p:spPr>
+          <p:style>
+            <a:lnRef idx="1">
+              <a:schemeClr val="accent1"/>
+            </a:lnRef>
+            <a:fillRef idx="0">
+              <a:schemeClr val="accent1"/>
+            </a:fillRef>
+            <a:effectRef idx="0">
+              <a:schemeClr val="accent1"/>
+            </a:effectRef>
+            <a:fontRef idx="minor">
+              <a:schemeClr val="tx1"/>
+            </a:fontRef>
+          </p:style>
+        </p:cxnSp>
+        <p:sp>
+          <p:nvSpPr>
+            <p:cNvPr id="14" name="TextBox 28">
+              <a:extLst>
+                <a:ext uri="{FF2B5EF4-FFF2-40B4-BE49-F238E27FC236}">
+                  <a16:creationId xmlns:a16="http://schemas.microsoft.com/office/drawing/2014/main" id="{22E2C8C6-E3B5-C31C-7473-7B90414E5175}"/>
+                </a:ext>
+              </a:extLst>
+            </p:cNvPr>
+            <p:cNvSpPr txBox="1">
+              <a:spLocks noChangeArrowheads="1"/>
+            </p:cNvSpPr>
+            <p:nvPr/>
+          </p:nvSpPr>
+          <p:spPr bwMode="auto">
+            <a:xfrm>
+              <a:off x="6400800" y="3246120"/>
+              <a:ext cx="1220787" cy="430887"/>
+            </a:xfrm>
+            <a:prstGeom prst="rect">
+              <a:avLst/>
+            </a:prstGeom>
+            <a:noFill/>
+            <a:ln>
+              <a:noFill/>
+            </a:ln>
+            <a:extLst>
+              <a:ext uri="{909E8E84-426E-40DD-AFC4-6F175D3DCCD1}">
+                <a14:hiddenFill xmlns:a14="http://schemas.microsoft.com/office/drawing/2010/main">
+                  <a:solidFill>
+                    <a:srgbClr val="FFFFFF"/>
+                  </a:solidFill>
+                </a14:hiddenFill>
+              </a:ext>
+              <a:ext uri="{91240B29-F687-4F45-9708-019B960494DF}">
+                <a14:hiddenLine xmlns:a14="http://schemas.microsoft.com/office/drawing/2010/main" w="9525">
+                  <a:solidFill>
+                    <a:srgbClr val="000000"/>
+                  </a:solidFill>
+                  <a:miter lim="800000"/>
+                  <a:headEnd/>
+                  <a:tailEnd/>
+                </a14:hiddenLine>
+              </a:ext>
+            </a:extLst>
+          </p:spPr>
+          <p:txBody>
+            <a:bodyPr>
+              <a:spAutoFit/>
+            </a:bodyPr>
+            <a:lstStyle>
+              <a:lvl1pPr>
+                <a:defRPr>
+                  <a:solidFill>
+                    <a:schemeClr val="tx1"/>
+                  </a:solidFill>
+                  <a:latin typeface="Calibri" panose="020F0502020204030204" pitchFamily="34" charset="0"/>
+                </a:defRPr>
+              </a:lvl1pPr>
+              <a:lvl2pPr marL="742950" indent="-285750">
+                <a:defRPr>
+                  <a:solidFill>
+                    <a:schemeClr val="tx1"/>
+                  </a:solidFill>
+                  <a:latin typeface="Calibri" panose="020F0502020204030204" pitchFamily="34" charset="0"/>
+                </a:defRPr>
+              </a:lvl2pPr>
+              <a:lvl3pPr marL="1143000" indent="-228600">
+                <a:defRPr>
+                  <a:solidFill>
+                    <a:schemeClr val="tx1"/>
+                  </a:solidFill>
+                  <a:latin typeface="Calibri" panose="020F0502020204030204" pitchFamily="34" charset="0"/>
+                </a:defRPr>
+              </a:lvl3pPr>
+              <a:lvl4pPr marL="1600200" indent="-228600">
+                <a:defRPr>
+                  <a:solidFill>
+                    <a:schemeClr val="tx1"/>
+                  </a:solidFill>
+                  <a:latin typeface="Calibri" panose="020F0502020204030204" pitchFamily="34" charset="0"/>
+                </a:defRPr>
+              </a:lvl4pPr>
+              <a:lvl5pPr marL="2057400" indent="-228600">
+                <a:defRPr>
+                  <a:solidFill>
+                    <a:schemeClr val="tx1"/>
+                  </a:solidFill>
+                  <a:latin typeface="Calibri" panose="020F0502020204030204" pitchFamily="34" charset="0"/>
+                </a:defRPr>
+              </a:lvl5pPr>
+              <a:lvl6pPr marL="2514600" indent="-228600" eaLnBrk="0" fontAlgn="base" hangingPunct="0">
+                <a:spcBef>
+                  <a:spcPct val="0"/>
+                </a:spcBef>
+                <a:spcAft>
+                  <a:spcPct val="0"/>
+                </a:spcAft>
+                <a:defRPr>
+                  <a:solidFill>
+                    <a:schemeClr val="tx1"/>
+                  </a:solidFill>
+                  <a:latin typeface="Calibri" panose="020F0502020204030204" pitchFamily="34" charset="0"/>
+                </a:defRPr>
+              </a:lvl6pPr>
+              <a:lvl7pPr marL="2971800" indent="-228600" eaLnBrk="0" fontAlgn="base" hangingPunct="0">
+                <a:spcBef>
+                  <a:spcPct val="0"/>
+                </a:spcBef>
+                <a:spcAft>
+                  <a:spcPct val="0"/>
+                </a:spcAft>
+                <a:defRPr>
+                  <a:solidFill>
+                    <a:schemeClr val="tx1"/>
+                  </a:solidFill>
+                  <a:latin typeface="Calibri" panose="020F0502020204030204" pitchFamily="34" charset="0"/>
+                </a:defRPr>
+              </a:lvl7pPr>
+              <a:lvl8pPr marL="3429000" indent="-228600" eaLnBrk="0" fontAlgn="base" hangingPunct="0">
+                <a:spcBef>
+                  <a:spcPct val="0"/>
+                </a:spcBef>
+                <a:spcAft>
+                  <a:spcPct val="0"/>
+                </a:spcAft>
+                <a:defRPr>
+                  <a:solidFill>
+                    <a:schemeClr val="tx1"/>
+                  </a:solidFill>
+                  <a:latin typeface="Calibri" panose="020F0502020204030204" pitchFamily="34" charset="0"/>
+                </a:defRPr>
+              </a:lvl8pPr>
+              <a:lvl9pPr marL="3886200" indent="-228600" eaLnBrk="0" fontAlgn="base" hangingPunct="0">
+                <a:spcBef>
+                  <a:spcPct val="0"/>
+                </a:spcBef>
+                <a:spcAft>
+                  <a:spcPct val="0"/>
+                </a:spcAft>
+                <a:defRPr>
+                  <a:solidFill>
+                    <a:schemeClr val="tx1"/>
+                  </a:solidFill>
+                  <a:latin typeface="Calibri" panose="020F0502020204030204" pitchFamily="34" charset="0"/>
+                </a:defRPr>
+              </a:lvl9pPr>
+            </a:lstStyle>
+            <a:p>
+              <a:pPr algn="ctr" eaLnBrk="1" hangingPunct="1"/>
+              <a:r>
+                <a:rPr lang="en-US" altLang="en-US" sz="1100" dirty="0">
+                  <a:latin typeface="Arial" panose="020B0604020202020204" pitchFamily="34" charset="0"/>
+                  <a:ea typeface="Amazon Ember" panose="020B0603020204020204" pitchFamily="34" charset="0"/>
+                  <a:cs typeface="Arial" panose="020B0604020202020204" pitchFamily="34" charset="0"/>
+                </a:rPr>
+                <a:t>Angular client application</a:t>
+              </a:r>
+            </a:p>
+          </p:txBody>
+        </p:sp>
+        <p:pic>
+          <p:nvPicPr>
+            <p:cNvPr id="15" name="Graphic 38">
+              <a:extLst>
+                <a:ext uri="{FF2B5EF4-FFF2-40B4-BE49-F238E27FC236}">
+                  <a16:creationId xmlns:a16="http://schemas.microsoft.com/office/drawing/2014/main" id="{ECE93832-CF0C-B981-5850-EE02F77BF5CE}"/>
+                </a:ext>
+              </a:extLst>
+            </p:cNvPr>
+            <p:cNvPicPr>
+              <a:picLocks noChangeAspect="1" noChangeArrowheads="1"/>
+            </p:cNvPicPr>
+            <p:nvPr/>
+          </p:nvPicPr>
+          <p:blipFill>
+            <a:blip r:embed="rId15">
+              <a:extLst>
+                <a:ext uri="{28A0092B-C50C-407E-A947-70E740481C1C}">
+                  <a14:useLocalDpi xmlns:a14="http://schemas.microsoft.com/office/drawing/2010/main" val="0"/>
+                </a:ext>
+              </a:extLst>
+            </a:blip>
+            <a:srcRect/>
+            <a:stretch>
+              <a:fillRect/>
+            </a:stretch>
+          </p:blipFill>
+          <p:spPr bwMode="auto">
+            <a:xfrm>
+              <a:off x="6766560" y="2834640"/>
+              <a:ext cx="457200" cy="457200"/>
+            </a:xfrm>
+            <a:prstGeom prst="rect">
+              <a:avLst/>
+            </a:prstGeom>
+            <a:noFill/>
+            <a:ln>
+              <a:noFill/>
+            </a:ln>
+            <a:extLst>
+              <a:ext uri="{909E8E84-426E-40DD-AFC4-6F175D3DCCD1}">
+                <a14:hiddenFill xmlns:a14="http://schemas.microsoft.com/office/drawing/2010/main">
+                  <a:solidFill>
+                    <a:srgbClr val="FFFFFF"/>
+                  </a:solidFill>
+                </a14:hiddenFill>
+              </a:ext>
+              <a:ext uri="{91240B29-F687-4F45-9708-019B960494DF}">
+                <a14:hiddenLine xmlns:a14="http://schemas.microsoft.com/office/drawing/2010/main" w="9525">
+                  <a:solidFill>
+                    <a:srgbClr val="000000"/>
+                  </a:solidFill>
+                  <a:miter lim="800000"/>
+                  <a:headEnd/>
+                  <a:tailEnd/>
+                </a14:hiddenLine>
+              </a:ext>
+            </a:extLst>
+          </p:spPr>
+        </p:pic>
+        <p:pic>
+          <p:nvPicPr>
+            <p:cNvPr id="47" name="Graphic 6">
+              <a:extLst>
+                <a:ext uri="{FF2B5EF4-FFF2-40B4-BE49-F238E27FC236}">
+                  <a16:creationId xmlns:a16="http://schemas.microsoft.com/office/drawing/2014/main" id="{23B7ECC1-BE5E-45CB-AF83-A99DF01DCA74}"/>
+                </a:ext>
+              </a:extLst>
+            </p:cNvPr>
+            <p:cNvPicPr>
+              <a:picLocks noChangeAspect="1" noChangeArrowheads="1"/>
+            </p:cNvPicPr>
+            <p:nvPr/>
+          </p:nvPicPr>
+          <p:blipFill>
+            <a:blip r:embed="rId17">
+              <a:extLst>
+                <a:ext uri="{28A0092B-C50C-407E-A947-70E740481C1C}">
+                  <a14:useLocalDpi xmlns:a14="http://schemas.microsoft.com/office/drawing/2010/main" val="0"/>
+                </a:ext>
+              </a:extLst>
+            </a:blip>
+            <a:srcRect/>
+            <a:stretch>
+              <a:fillRect/>
+            </a:stretch>
+          </p:blipFill>
+          <p:spPr bwMode="auto">
+            <a:xfrm>
+              <a:off x="4480560" y="2834640"/>
+              <a:ext cx="457200" cy="457200"/>
+            </a:xfrm>
+            <a:prstGeom prst="rect">
+              <a:avLst/>
+            </a:prstGeom>
+            <a:noFill/>
+            <a:ln>
+              <a:noFill/>
+            </a:ln>
+            <a:extLst>
+              <a:ext uri="{909E8E84-426E-40DD-AFC4-6F175D3DCCD1}">
+                <a14:hiddenFill xmlns:a14="http://schemas.microsoft.com/office/drawing/2010/main">
+                  <a:solidFill>
+                    <a:srgbClr val="FFFFFF"/>
+                  </a:solidFill>
+                </a14:hiddenFill>
+              </a:ext>
+              <a:ext uri="{91240B29-F687-4F45-9708-019B960494DF}">
+                <a14:hiddenLine xmlns:a14="http://schemas.microsoft.com/office/drawing/2010/main" w="9525">
+                  <a:solidFill>
+                    <a:srgbClr val="000000"/>
+                  </a:solidFill>
+                  <a:miter lim="800000"/>
+                  <a:headEnd/>
+                  <a:tailEnd/>
+                </a14:hiddenLine>
+              </a:ext>
+            </a:extLst>
+          </p:spPr>
+        </p:pic>
+        <p:sp>
+          <p:nvSpPr>
+            <p:cNvPr id="48" name="TextBox 47">
+              <a:extLst>
+                <a:ext uri="{FF2B5EF4-FFF2-40B4-BE49-F238E27FC236}">
+                  <a16:creationId xmlns:a16="http://schemas.microsoft.com/office/drawing/2014/main" id="{2111E485-C376-4338-86AB-AA41BAF95B1D}"/>
+                </a:ext>
+              </a:extLst>
+            </p:cNvPr>
+            <p:cNvSpPr txBox="1"/>
+            <p:nvPr/>
+          </p:nvSpPr>
+          <p:spPr>
+            <a:xfrm>
+              <a:off x="4251960" y="3246120"/>
+              <a:ext cx="914400" cy="276999"/>
+            </a:xfrm>
+            <a:prstGeom prst="rect">
+              <a:avLst/>
+            </a:prstGeom>
+            <a:noFill/>
+          </p:spPr>
+          <p:txBody>
+            <a:bodyPr wrap="square" rtlCol="0" anchor="t">
+              <a:spAutoFit/>
+            </a:bodyPr>
+            <a:lstStyle/>
+            <a:p>
+              <a:pPr algn="ctr"/>
+              <a:r>
+                <a:rPr lang="en-US" sz="1200" dirty="0">
+                  <a:latin typeface="Arial" panose="020B0604020202020204" pitchFamily="34" charset="0"/>
+                  <a:cs typeface="Arial" panose="020B0604020202020204" pitchFamily="34" charset="0"/>
+                </a:rPr>
+                <a:t>Image URI</a:t>
+              </a:r>
+            </a:p>
+          </p:txBody>
+        </p:sp>
+        <p:cxnSp>
+          <p:nvCxnSpPr>
+            <p:cNvPr id="50" name="Straight Arrow Connector 49">
+              <a:extLst>
+                <a:ext uri="{FF2B5EF4-FFF2-40B4-BE49-F238E27FC236}">
+                  <a16:creationId xmlns:a16="http://schemas.microsoft.com/office/drawing/2014/main" id="{F29C5B04-B309-419A-B8C2-F2671D6A9178}"/>
+                </a:ext>
+              </a:extLst>
+            </p:cNvPr>
+            <p:cNvCxnSpPr>
+              <a:cxnSpLocks/>
+              <a:stCxn id="47" idx="3"/>
+              <a:endCxn id="15" idx="1"/>
+            </p:cNvCxnSpPr>
+            <p:nvPr/>
+          </p:nvCxnSpPr>
+          <p:spPr>
+            <a:xfrm>
+              <a:off x="4937760" y="3063240"/>
+              <a:ext cx="1828800" cy="0"/>
+            </a:xfrm>
+            <a:prstGeom prst="straightConnector1">
+              <a:avLst/>
+            </a:prstGeom>
+            <a:ln w="12700">
+              <a:solidFill>
+                <a:schemeClr val="tx2"/>
+              </a:solidFill>
+              <a:headEnd type="none" w="med" len="sm"/>
+              <a:tailEnd type="arrow" w="med" len="sm"/>
+            </a:ln>
+          </p:spPr>
+          <p:style>
+            <a:lnRef idx="1">
+              <a:schemeClr val="accent1"/>
+            </a:lnRef>
+            <a:fillRef idx="0">
+              <a:schemeClr val="accent1"/>
+            </a:fillRef>
+            <a:effectRef idx="0">
+              <a:schemeClr val="accent1"/>
+            </a:effectRef>
+            <a:fontRef idx="minor">
+              <a:schemeClr val="tx1"/>
+            </a:fontRef>
+          </p:style>
+        </p:cxnSp>
+      </p:grpSp>
       <p:sp>
         <p:nvSpPr>
-          <p:cNvPr id="14" name="TextBox 28">
+          <p:cNvPr id="16" name="TextBox 28">
             <a:extLst>
               <a:ext uri="{FF2B5EF4-FFF2-40B4-BE49-F238E27FC236}">
-                <a16:creationId xmlns:a16="http://schemas.microsoft.com/office/drawing/2014/main" id="{22E2C8C6-E3B5-C31C-7473-7B90414E5175}"/>
+                <a16:creationId xmlns:a16="http://schemas.microsoft.com/office/drawing/2014/main" id="{9B7056F3-A4E7-0B62-B386-BC68D5DA3C3E}"/>
               </a:ext>
             </a:extLst>
           </p:cNvPr>
@@ -3982,8 +4359,8 @@
         </p:nvSpPr>
         <p:spPr bwMode="auto">
           <a:xfrm>
-            <a:off x="6400800" y="3246120"/>
-            <a:ext cx="1220787" cy="261610"/>
+            <a:off x="6330314" y="4069080"/>
+            <a:ext cx="1371600" cy="274320"/>
           </a:xfrm>
           <a:prstGeom prst="rect">
             <a:avLst/>
@@ -4122,17 +4499,17 @@
                 <a:ea typeface="Amazon Ember" panose="020B0603020204020204" pitchFamily="34" charset="0"/>
                 <a:cs typeface="Arial" panose="020B0604020202020204" pitchFamily="34" charset="0"/>
               </a:rPr>
-              <a:t>Client service</a:t>
+              <a:t>Server application</a:t>
             </a:r>
           </a:p>
         </p:txBody>
       </p:sp>
       <p:pic>
         <p:nvPicPr>
-          <p:cNvPr id="15" name="Graphic 38">
+          <p:cNvPr id="17" name="Graphic 38">
             <a:extLst>
               <a:ext uri="{FF2B5EF4-FFF2-40B4-BE49-F238E27FC236}">
-                <a16:creationId xmlns:a16="http://schemas.microsoft.com/office/drawing/2014/main" id="{ECE93832-CF0C-B981-5850-EE02F77BF5CE}"/>
+                <a16:creationId xmlns:a16="http://schemas.microsoft.com/office/drawing/2014/main" id="{4E9C796E-1637-D4BF-A471-5F97B322061E}"/>
               </a:ext>
             </a:extLst>
           </p:cNvPr>
@@ -4142,374 +4519,7 @@
           <p:nvPr/>
         </p:nvPicPr>
         <p:blipFill>
-          <a:blip r:embed="rId16">
-            <a:extLst>
-              <a:ext uri="{28A0092B-C50C-407E-A947-70E740481C1C}">
-                <a14:useLocalDpi xmlns:a14="http://schemas.microsoft.com/office/drawing/2010/main" val="0"/>
-              </a:ext>
-            </a:extLst>
-          </a:blip>
-          <a:srcRect/>
-          <a:stretch>
-            <a:fillRect/>
-          </a:stretch>
-        </p:blipFill>
-        <p:spPr bwMode="auto">
-          <a:xfrm>
-            <a:off x="6766560" y="2834640"/>
-            <a:ext cx="457200" cy="457200"/>
-          </a:xfrm>
-          <a:prstGeom prst="rect">
-            <a:avLst/>
-          </a:prstGeom>
-          <a:noFill/>
-          <a:ln>
-            <a:noFill/>
-          </a:ln>
-          <a:extLst>
-            <a:ext uri="{909E8E84-426E-40DD-AFC4-6F175D3DCCD1}">
-              <a14:hiddenFill xmlns:a14="http://schemas.microsoft.com/office/drawing/2010/main">
-                <a:solidFill>
-                  <a:srgbClr val="FFFFFF"/>
-                </a:solidFill>
-              </a14:hiddenFill>
-            </a:ext>
-            <a:ext uri="{91240B29-F687-4F45-9708-019B960494DF}">
-              <a14:hiddenLine xmlns:a14="http://schemas.microsoft.com/office/drawing/2010/main" w="9525">
-                <a:solidFill>
-                  <a:srgbClr val="000000"/>
-                </a:solidFill>
-                <a:miter lim="800000"/>
-                <a:headEnd/>
-                <a:tailEnd/>
-              </a14:hiddenLine>
-            </a:ext>
-          </a:extLst>
-        </p:spPr>
-      </p:pic>
-      <p:pic>
-        <p:nvPicPr>
-          <p:cNvPr id="47" name="Graphic 6">
-            <a:extLst>
-              <a:ext uri="{FF2B5EF4-FFF2-40B4-BE49-F238E27FC236}">
-                <a16:creationId xmlns:a16="http://schemas.microsoft.com/office/drawing/2014/main" id="{23B7ECC1-BE5E-45CB-AF83-A99DF01DCA74}"/>
-              </a:ext>
-            </a:extLst>
-          </p:cNvPr>
-          <p:cNvPicPr>
-            <a:picLocks noChangeAspect="1" noChangeArrowheads="1"/>
-          </p:cNvPicPr>
-          <p:nvPr/>
-        </p:nvPicPr>
-        <p:blipFill>
-          <a:blip r:embed="rId17">
-            <a:extLst>
-              <a:ext uri="{28A0092B-C50C-407E-A947-70E740481C1C}">
-                <a14:useLocalDpi xmlns:a14="http://schemas.microsoft.com/office/drawing/2010/main" val="0"/>
-              </a:ext>
-            </a:extLst>
-          </a:blip>
-          <a:srcRect/>
-          <a:stretch>
-            <a:fillRect/>
-          </a:stretch>
-        </p:blipFill>
-        <p:spPr bwMode="auto">
-          <a:xfrm>
-            <a:off x="4480560" y="2834640"/>
-            <a:ext cx="457200" cy="457200"/>
-          </a:xfrm>
-          <a:prstGeom prst="rect">
-            <a:avLst/>
-          </a:prstGeom>
-          <a:noFill/>
-          <a:ln>
-            <a:noFill/>
-          </a:ln>
-          <a:extLst>
-            <a:ext uri="{909E8E84-426E-40DD-AFC4-6F175D3DCCD1}">
-              <a14:hiddenFill xmlns:a14="http://schemas.microsoft.com/office/drawing/2010/main">
-                <a:solidFill>
-                  <a:srgbClr val="FFFFFF"/>
-                </a:solidFill>
-              </a14:hiddenFill>
-            </a:ext>
-            <a:ext uri="{91240B29-F687-4F45-9708-019B960494DF}">
-              <a14:hiddenLine xmlns:a14="http://schemas.microsoft.com/office/drawing/2010/main" w="9525">
-                <a:solidFill>
-                  <a:srgbClr val="000000"/>
-                </a:solidFill>
-                <a:miter lim="800000"/>
-                <a:headEnd/>
-                <a:tailEnd/>
-              </a14:hiddenLine>
-            </a:ext>
-          </a:extLst>
-        </p:spPr>
-      </p:pic>
-      <p:sp>
-        <p:nvSpPr>
-          <p:cNvPr id="48" name="TextBox 47">
-            <a:extLst>
-              <a:ext uri="{FF2B5EF4-FFF2-40B4-BE49-F238E27FC236}">
-                <a16:creationId xmlns:a16="http://schemas.microsoft.com/office/drawing/2014/main" id="{2111E485-C376-4338-86AB-AA41BAF95B1D}"/>
-              </a:ext>
-            </a:extLst>
-          </p:cNvPr>
-          <p:cNvSpPr txBox="1"/>
-          <p:nvPr/>
-        </p:nvSpPr>
-        <p:spPr>
-          <a:xfrm>
-            <a:off x="4251960" y="3246120"/>
-            <a:ext cx="914400" cy="276999"/>
-          </a:xfrm>
-          <a:prstGeom prst="rect">
-            <a:avLst/>
-          </a:prstGeom>
-          <a:noFill/>
-        </p:spPr>
-        <p:txBody>
-          <a:bodyPr wrap="square" rtlCol="0" anchor="t">
-            <a:spAutoFit/>
-          </a:bodyPr>
-          <a:lstStyle/>
-          <a:p>
-            <a:pPr algn="ctr"/>
-            <a:r>
-              <a:rPr lang="en-US" sz="1200" dirty="0">
-                <a:latin typeface="Arial" panose="020B0604020202020204" pitchFamily="34" charset="0"/>
-                <a:cs typeface="Arial" panose="020B0604020202020204" pitchFamily="34" charset="0"/>
-              </a:rPr>
-              <a:t>Image URI</a:t>
-            </a:r>
-          </a:p>
-        </p:txBody>
-      </p:sp>
-      <p:cxnSp>
-        <p:nvCxnSpPr>
-          <p:cNvPr id="50" name="Straight Arrow Connector 49">
-            <a:extLst>
-              <a:ext uri="{FF2B5EF4-FFF2-40B4-BE49-F238E27FC236}">
-                <a16:creationId xmlns:a16="http://schemas.microsoft.com/office/drawing/2014/main" id="{F29C5B04-B309-419A-B8C2-F2671D6A9178}"/>
-              </a:ext>
-            </a:extLst>
-          </p:cNvPr>
-          <p:cNvCxnSpPr>
-            <a:cxnSpLocks/>
-            <a:stCxn id="47" idx="3"/>
-            <a:endCxn id="15" idx="1"/>
-          </p:cNvCxnSpPr>
-          <p:nvPr/>
-        </p:nvCxnSpPr>
-        <p:spPr>
-          <a:xfrm>
-            <a:off x="4937760" y="3063240"/>
-            <a:ext cx="1828800" cy="0"/>
-          </a:xfrm>
-          <a:prstGeom prst="straightConnector1">
-            <a:avLst/>
-          </a:prstGeom>
-          <a:ln w="12700">
-            <a:solidFill>
-              <a:schemeClr val="tx2"/>
-            </a:solidFill>
-            <a:headEnd type="none" w="med" len="sm"/>
-            <a:tailEnd type="arrow" w="med" len="sm"/>
-          </a:ln>
-        </p:spPr>
-        <p:style>
-          <a:lnRef idx="1">
-            <a:schemeClr val="accent1"/>
-          </a:lnRef>
-          <a:fillRef idx="0">
-            <a:schemeClr val="accent1"/>
-          </a:fillRef>
-          <a:effectRef idx="0">
-            <a:schemeClr val="accent1"/>
-          </a:effectRef>
-          <a:fontRef idx="minor">
-            <a:schemeClr val="tx1"/>
-          </a:fontRef>
-        </p:style>
-      </p:cxnSp>
-      <p:sp>
-        <p:nvSpPr>
-          <p:cNvPr id="16" name="TextBox 28">
-            <a:extLst>
-              <a:ext uri="{FF2B5EF4-FFF2-40B4-BE49-F238E27FC236}">
-                <a16:creationId xmlns:a16="http://schemas.microsoft.com/office/drawing/2014/main" id="{9B7056F3-A4E7-0B62-B386-BC68D5DA3C3E}"/>
-              </a:ext>
-            </a:extLst>
-          </p:cNvPr>
-          <p:cNvSpPr txBox="1">
-            <a:spLocks noChangeArrowheads="1"/>
-          </p:cNvSpPr>
-          <p:nvPr/>
-        </p:nvSpPr>
-        <p:spPr bwMode="auto">
-          <a:xfrm>
-            <a:off x="6400800" y="4069080"/>
-            <a:ext cx="1220787" cy="261610"/>
-          </a:xfrm>
-          <a:prstGeom prst="rect">
-            <a:avLst/>
-          </a:prstGeom>
-          <a:noFill/>
-          <a:ln>
-            <a:noFill/>
-          </a:ln>
-          <a:extLst>
-            <a:ext uri="{909E8E84-426E-40DD-AFC4-6F175D3DCCD1}">
-              <a14:hiddenFill xmlns:a14="http://schemas.microsoft.com/office/drawing/2010/main">
-                <a:solidFill>
-                  <a:srgbClr val="FFFFFF"/>
-                </a:solidFill>
-              </a14:hiddenFill>
-            </a:ext>
-            <a:ext uri="{91240B29-F687-4F45-9708-019B960494DF}">
-              <a14:hiddenLine xmlns:a14="http://schemas.microsoft.com/office/drawing/2010/main" w="9525">
-                <a:solidFill>
-                  <a:srgbClr val="000000"/>
-                </a:solidFill>
-                <a:miter lim="800000"/>
-                <a:headEnd/>
-                <a:tailEnd/>
-              </a14:hiddenLine>
-            </a:ext>
-          </a:extLst>
-        </p:spPr>
-        <p:txBody>
-          <a:bodyPr>
-            <a:spAutoFit/>
-          </a:bodyPr>
-          <a:lstStyle>
-            <a:lvl1pPr>
-              <a:defRPr>
-                <a:solidFill>
-                  <a:schemeClr val="tx1"/>
-                </a:solidFill>
-                <a:latin typeface="Calibri" panose="020F0502020204030204" pitchFamily="34" charset="0"/>
-              </a:defRPr>
-            </a:lvl1pPr>
-            <a:lvl2pPr marL="742950" indent="-285750">
-              <a:defRPr>
-                <a:solidFill>
-                  <a:schemeClr val="tx1"/>
-                </a:solidFill>
-                <a:latin typeface="Calibri" panose="020F0502020204030204" pitchFamily="34" charset="0"/>
-              </a:defRPr>
-            </a:lvl2pPr>
-            <a:lvl3pPr marL="1143000" indent="-228600">
-              <a:defRPr>
-                <a:solidFill>
-                  <a:schemeClr val="tx1"/>
-                </a:solidFill>
-                <a:latin typeface="Calibri" panose="020F0502020204030204" pitchFamily="34" charset="0"/>
-              </a:defRPr>
-            </a:lvl3pPr>
-            <a:lvl4pPr marL="1600200" indent="-228600">
-              <a:defRPr>
-                <a:solidFill>
-                  <a:schemeClr val="tx1"/>
-                </a:solidFill>
-                <a:latin typeface="Calibri" panose="020F0502020204030204" pitchFamily="34" charset="0"/>
-              </a:defRPr>
-            </a:lvl4pPr>
-            <a:lvl5pPr marL="2057400" indent="-228600">
-              <a:defRPr>
-                <a:solidFill>
-                  <a:schemeClr val="tx1"/>
-                </a:solidFill>
-                <a:latin typeface="Calibri" panose="020F0502020204030204" pitchFamily="34" charset="0"/>
-              </a:defRPr>
-            </a:lvl5pPr>
-            <a:lvl6pPr marL="2514600" indent="-228600" eaLnBrk="0" fontAlgn="base" hangingPunct="0">
-              <a:spcBef>
-                <a:spcPct val="0"/>
-              </a:spcBef>
-              <a:spcAft>
-                <a:spcPct val="0"/>
-              </a:spcAft>
-              <a:defRPr>
-                <a:solidFill>
-                  <a:schemeClr val="tx1"/>
-                </a:solidFill>
-                <a:latin typeface="Calibri" panose="020F0502020204030204" pitchFamily="34" charset="0"/>
-              </a:defRPr>
-            </a:lvl6pPr>
-            <a:lvl7pPr marL="2971800" indent="-228600" eaLnBrk="0" fontAlgn="base" hangingPunct="0">
-              <a:spcBef>
-                <a:spcPct val="0"/>
-              </a:spcBef>
-              <a:spcAft>
-                <a:spcPct val="0"/>
-              </a:spcAft>
-              <a:defRPr>
-                <a:solidFill>
-                  <a:schemeClr val="tx1"/>
-                </a:solidFill>
-                <a:latin typeface="Calibri" panose="020F0502020204030204" pitchFamily="34" charset="0"/>
-              </a:defRPr>
-            </a:lvl7pPr>
-            <a:lvl8pPr marL="3429000" indent="-228600" eaLnBrk="0" fontAlgn="base" hangingPunct="0">
-              <a:spcBef>
-                <a:spcPct val="0"/>
-              </a:spcBef>
-              <a:spcAft>
-                <a:spcPct val="0"/>
-              </a:spcAft>
-              <a:defRPr>
-                <a:solidFill>
-                  <a:schemeClr val="tx1"/>
-                </a:solidFill>
-                <a:latin typeface="Calibri" panose="020F0502020204030204" pitchFamily="34" charset="0"/>
-              </a:defRPr>
-            </a:lvl8pPr>
-            <a:lvl9pPr marL="3886200" indent="-228600" eaLnBrk="0" fontAlgn="base" hangingPunct="0">
-              <a:spcBef>
-                <a:spcPct val="0"/>
-              </a:spcBef>
-              <a:spcAft>
-                <a:spcPct val="0"/>
-              </a:spcAft>
-              <a:defRPr>
-                <a:solidFill>
-                  <a:schemeClr val="tx1"/>
-                </a:solidFill>
-                <a:latin typeface="Calibri" panose="020F0502020204030204" pitchFamily="34" charset="0"/>
-              </a:defRPr>
-            </a:lvl9pPr>
-          </a:lstStyle>
-          <a:p>
-            <a:pPr algn="ctr" eaLnBrk="1" hangingPunct="1"/>
-            <a:r>
-              <a:rPr lang="en-US" altLang="en-US" sz="1100" dirty="0">
-                <a:latin typeface="Arial" panose="020B0604020202020204" pitchFamily="34" charset="0"/>
-                <a:ea typeface="Amazon Ember" panose="020B0603020204020204" pitchFamily="34" charset="0"/>
-                <a:cs typeface="Arial" panose="020B0604020202020204" pitchFamily="34" charset="0"/>
-              </a:rPr>
-              <a:t>Server service</a:t>
-            </a:r>
-          </a:p>
-        </p:txBody>
-      </p:sp>
-      <p:pic>
-        <p:nvPicPr>
-          <p:cNvPr id="17" name="Graphic 38">
-            <a:extLst>
-              <a:ext uri="{FF2B5EF4-FFF2-40B4-BE49-F238E27FC236}">
-                <a16:creationId xmlns:a16="http://schemas.microsoft.com/office/drawing/2014/main" id="{4E9C796E-1637-D4BF-A471-5F97B322061E}"/>
-              </a:ext>
-            </a:extLst>
-          </p:cNvPr>
-          <p:cNvPicPr>
-            <a:picLocks noChangeAspect="1" noChangeArrowheads="1"/>
-          </p:cNvPicPr>
-          <p:nvPr/>
-        </p:nvPicPr>
-        <p:blipFill>
-          <a:blip r:embed="rId16">
+          <a:blip r:embed="rId15">
             <a:extLst>
               <a:ext uri="{28A0092B-C50C-407E-A947-70E740481C1C}">
                 <a14:useLocalDpi xmlns:a14="http://schemas.microsoft.com/office/drawing/2010/main" val="0"/>

</xml_diff>